<commit_message>
Added section on unit test
</commit_message>
<xml_diff>
--- a/tutorial/CellProfiler_Developer_Tutorial.pptx
+++ b/tutorial/CellProfiler_Developer_Tutorial.pptx
@@ -4,6 +4,9 @@
   <p:sldMasterIdLst>
     <p:sldMasterId id="2147483660" r:id="rId1"/>
   </p:sldMasterIdLst>
+  <p:notesMasterIdLst>
+    <p:notesMasterId r:id="rId42"/>
+  </p:notesMasterIdLst>
   <p:sldIdLst>
     <p:sldId id="256" r:id="rId2"/>
     <p:sldId id="257" r:id="rId3"/>
@@ -35,14 +38,16 @@
     <p:sldId id="282" r:id="rId29"/>
     <p:sldId id="284" r:id="rId30"/>
     <p:sldId id="285" r:id="rId31"/>
-    <p:sldId id="286" r:id="rId32"/>
-    <p:sldId id="288" r:id="rId33"/>
-    <p:sldId id="289" r:id="rId34"/>
-    <p:sldId id="287" r:id="rId35"/>
-    <p:sldId id="290" r:id="rId36"/>
-    <p:sldId id="291" r:id="rId37"/>
-    <p:sldId id="292" r:id="rId38"/>
-    <p:sldId id="293" r:id="rId39"/>
+    <p:sldId id="294" r:id="rId32"/>
+    <p:sldId id="295" r:id="rId33"/>
+    <p:sldId id="286" r:id="rId34"/>
+    <p:sldId id="288" r:id="rId35"/>
+    <p:sldId id="289" r:id="rId36"/>
+    <p:sldId id="287" r:id="rId37"/>
+    <p:sldId id="290" r:id="rId38"/>
+    <p:sldId id="291" r:id="rId39"/>
+    <p:sldId id="292" r:id="rId40"/>
+    <p:sldId id="293" r:id="rId41"/>
   </p:sldIdLst>
   <p:sldSz cx="9144000" cy="6858000" type="screen4x3"/>
   <p:notesSz cx="6858000" cy="9144000"/>
@@ -142,6 +147,440 @@
     </a:lvl9pPr>
   </p:defaultTextStyle>
 </p:presentation>
+</file>
+
+<file path=ppt/notesMasters/notesMaster1.xml><?xml version="1.0" encoding="utf-8"?>
+<p:notesMaster xmlns:a="http://schemas.openxmlformats.org/drawingml/2006/main" xmlns:r="http://schemas.openxmlformats.org/officeDocument/2006/relationships" xmlns:p="http://schemas.openxmlformats.org/presentationml/2006/main">
+  <p:cSld>
+    <p:bg>
+      <p:bgRef idx="1001">
+        <a:schemeClr val="bg1"/>
+      </p:bgRef>
+    </p:bg>
+    <p:spTree>
+      <p:nvGrpSpPr>
+        <p:cNvPr id="1" name=""/>
+        <p:cNvGrpSpPr/>
+        <p:nvPr/>
+      </p:nvGrpSpPr>
+      <p:grpSpPr>
+        <a:xfrm>
+          <a:off x="0" y="0"/>
+          <a:ext cx="0" cy="0"/>
+          <a:chOff x="0" y="0"/>
+          <a:chExt cx="0" cy="0"/>
+        </a:xfrm>
+      </p:grpSpPr>
+      <p:sp>
+        <p:nvSpPr>
+          <p:cNvPr id="2" name="Header Placeholder 1"/>
+          <p:cNvSpPr>
+            <a:spLocks noGrp="1"/>
+          </p:cNvSpPr>
+          <p:nvPr>
+            <p:ph type="hdr" sz="quarter"/>
+          </p:nvPr>
+        </p:nvSpPr>
+        <p:spPr>
+          <a:xfrm>
+            <a:off x="0" y="0"/>
+            <a:ext cx="2971800" cy="457200"/>
+          </a:xfrm>
+          <a:prstGeom prst="rect">
+            <a:avLst/>
+          </a:prstGeom>
+        </p:spPr>
+        <p:txBody>
+          <a:bodyPr vert="horz" lIns="91440" tIns="45720" rIns="91440" bIns="45720" rtlCol="0"/>
+          <a:lstStyle>
+            <a:lvl1pPr algn="l">
+              <a:defRPr sz="1200"/>
+            </a:lvl1pPr>
+          </a:lstStyle>
+          <a:p>
+            <a:endParaRPr lang="en-US"/>
+          </a:p>
+        </p:txBody>
+      </p:sp>
+      <p:sp>
+        <p:nvSpPr>
+          <p:cNvPr id="3" name="Date Placeholder 2"/>
+          <p:cNvSpPr>
+            <a:spLocks noGrp="1"/>
+          </p:cNvSpPr>
+          <p:nvPr>
+            <p:ph type="dt" idx="1"/>
+          </p:nvPr>
+        </p:nvSpPr>
+        <p:spPr>
+          <a:xfrm>
+            <a:off x="3884613" y="0"/>
+            <a:ext cx="2971800" cy="457200"/>
+          </a:xfrm>
+          <a:prstGeom prst="rect">
+            <a:avLst/>
+          </a:prstGeom>
+        </p:spPr>
+        <p:txBody>
+          <a:bodyPr vert="horz" lIns="91440" tIns="45720" rIns="91440" bIns="45720" rtlCol="0"/>
+          <a:lstStyle>
+            <a:lvl1pPr algn="r">
+              <a:defRPr sz="1200"/>
+            </a:lvl1pPr>
+          </a:lstStyle>
+          <a:p>
+            <a:fld id="{4E4C87E7-C32C-4639-B929-87ED8E592C81}" type="datetimeFigureOut">
+              <a:rPr lang="en-US" smtClean="0"/>
+              <a:t>3/26/2013</a:t>
+            </a:fld>
+            <a:endParaRPr lang="en-US"/>
+          </a:p>
+        </p:txBody>
+      </p:sp>
+      <p:sp>
+        <p:nvSpPr>
+          <p:cNvPr id="4" name="Slide Image Placeholder 3"/>
+          <p:cNvSpPr>
+            <a:spLocks noGrp="1" noRot="1" noChangeAspect="1"/>
+          </p:cNvSpPr>
+          <p:nvPr>
+            <p:ph type="sldImg" idx="2"/>
+          </p:nvPr>
+        </p:nvSpPr>
+        <p:spPr>
+          <a:xfrm>
+            <a:off x="1143000" y="685800"/>
+            <a:ext cx="4572000" cy="3429000"/>
+          </a:xfrm>
+          <a:prstGeom prst="rect">
+            <a:avLst/>
+          </a:prstGeom>
+          <a:noFill/>
+          <a:ln w="12700">
+            <a:solidFill>
+              <a:prstClr val="black"/>
+            </a:solidFill>
+          </a:ln>
+        </p:spPr>
+        <p:txBody>
+          <a:bodyPr vert="horz" lIns="91440" tIns="45720" rIns="91440" bIns="45720" rtlCol="0" anchor="ctr"/>
+          <a:lstStyle/>
+          <a:p>
+            <a:endParaRPr lang="en-US"/>
+          </a:p>
+        </p:txBody>
+      </p:sp>
+      <p:sp>
+        <p:nvSpPr>
+          <p:cNvPr id="5" name="Notes Placeholder 4"/>
+          <p:cNvSpPr>
+            <a:spLocks noGrp="1"/>
+          </p:cNvSpPr>
+          <p:nvPr>
+            <p:ph type="body" sz="quarter" idx="3"/>
+          </p:nvPr>
+        </p:nvSpPr>
+        <p:spPr>
+          <a:xfrm>
+            <a:off x="685800" y="4343400"/>
+            <a:ext cx="5486400" cy="4114800"/>
+          </a:xfrm>
+          <a:prstGeom prst="rect">
+            <a:avLst/>
+          </a:prstGeom>
+        </p:spPr>
+        <p:txBody>
+          <a:bodyPr vert="horz" lIns="91440" tIns="45720" rIns="91440" bIns="45720" rtlCol="0"/>
+          <a:lstStyle/>
+          <a:p>
+            <a:pPr lvl="0"/>
+            <a:r>
+              <a:rPr lang="en-US" smtClean="0"/>
+              <a:t>Click to edit Master text styles</a:t>
+            </a:r>
+          </a:p>
+          <a:p>
+            <a:pPr lvl="1"/>
+            <a:r>
+              <a:rPr lang="en-US" smtClean="0"/>
+              <a:t>Second level</a:t>
+            </a:r>
+          </a:p>
+          <a:p>
+            <a:pPr lvl="2"/>
+            <a:r>
+              <a:rPr lang="en-US" smtClean="0"/>
+              <a:t>Third level</a:t>
+            </a:r>
+          </a:p>
+          <a:p>
+            <a:pPr lvl="3"/>
+            <a:r>
+              <a:rPr lang="en-US" smtClean="0"/>
+              <a:t>Fourth level</a:t>
+            </a:r>
+          </a:p>
+          <a:p>
+            <a:pPr lvl="4"/>
+            <a:r>
+              <a:rPr lang="en-US" smtClean="0"/>
+              <a:t>Fifth level</a:t>
+            </a:r>
+            <a:endParaRPr lang="en-US"/>
+          </a:p>
+        </p:txBody>
+      </p:sp>
+      <p:sp>
+        <p:nvSpPr>
+          <p:cNvPr id="6" name="Footer Placeholder 5"/>
+          <p:cNvSpPr>
+            <a:spLocks noGrp="1"/>
+          </p:cNvSpPr>
+          <p:nvPr>
+            <p:ph type="ftr" sz="quarter" idx="4"/>
+          </p:nvPr>
+        </p:nvSpPr>
+        <p:spPr>
+          <a:xfrm>
+            <a:off x="0" y="8685213"/>
+            <a:ext cx="2971800" cy="457200"/>
+          </a:xfrm>
+          <a:prstGeom prst="rect">
+            <a:avLst/>
+          </a:prstGeom>
+        </p:spPr>
+        <p:txBody>
+          <a:bodyPr vert="horz" lIns="91440" tIns="45720" rIns="91440" bIns="45720" rtlCol="0" anchor="b"/>
+          <a:lstStyle>
+            <a:lvl1pPr algn="l">
+              <a:defRPr sz="1200"/>
+            </a:lvl1pPr>
+          </a:lstStyle>
+          <a:p>
+            <a:endParaRPr lang="en-US"/>
+          </a:p>
+        </p:txBody>
+      </p:sp>
+      <p:sp>
+        <p:nvSpPr>
+          <p:cNvPr id="7" name="Slide Number Placeholder 6"/>
+          <p:cNvSpPr>
+            <a:spLocks noGrp="1"/>
+          </p:cNvSpPr>
+          <p:nvPr>
+            <p:ph type="sldNum" sz="quarter" idx="5"/>
+          </p:nvPr>
+        </p:nvSpPr>
+        <p:spPr>
+          <a:xfrm>
+            <a:off x="3884613" y="8685213"/>
+            <a:ext cx="2971800" cy="457200"/>
+          </a:xfrm>
+          <a:prstGeom prst="rect">
+            <a:avLst/>
+          </a:prstGeom>
+        </p:spPr>
+        <p:txBody>
+          <a:bodyPr vert="horz" lIns="91440" tIns="45720" rIns="91440" bIns="45720" rtlCol="0" anchor="b"/>
+          <a:lstStyle>
+            <a:lvl1pPr algn="r">
+              <a:defRPr sz="1200"/>
+            </a:lvl1pPr>
+          </a:lstStyle>
+          <a:p>
+            <a:fld id="{E56E9C0E-1013-446D-B4EA-A75F7BFEAF03}" type="slidenum">
+              <a:rPr lang="en-US" smtClean="0"/>
+              <a:t>‹#›</a:t>
+            </a:fld>
+            <a:endParaRPr lang="en-US"/>
+          </a:p>
+        </p:txBody>
+      </p:sp>
+    </p:spTree>
+    <p:extLst>
+      <p:ext uri="{BB962C8B-B14F-4D97-AF65-F5344CB8AC3E}">
+        <p14:creationId xmlns:p14="http://schemas.microsoft.com/office/powerpoint/2010/main" val="1144888459"/>
+      </p:ext>
+    </p:extLst>
+  </p:cSld>
+  <p:clrMap bg1="lt1" tx1="dk1" bg2="lt2" tx2="dk2" accent1="accent1" accent2="accent2" accent3="accent3" accent4="accent4" accent5="accent5" accent6="accent6" hlink="hlink" folHlink="folHlink"/>
+  <p:notesStyle>
+    <a:lvl1pPr marL="0" algn="l" defTabSz="914400" rtl="0" eaLnBrk="1" latinLnBrk="0" hangingPunct="1">
+      <a:defRPr sz="1200" kern="1200">
+        <a:solidFill>
+          <a:schemeClr val="tx1"/>
+        </a:solidFill>
+        <a:latin typeface="+mn-lt"/>
+        <a:ea typeface="+mn-ea"/>
+        <a:cs typeface="+mn-cs"/>
+      </a:defRPr>
+    </a:lvl1pPr>
+    <a:lvl2pPr marL="457200" algn="l" defTabSz="914400" rtl="0" eaLnBrk="1" latinLnBrk="0" hangingPunct="1">
+      <a:defRPr sz="1200" kern="1200">
+        <a:solidFill>
+          <a:schemeClr val="tx1"/>
+        </a:solidFill>
+        <a:latin typeface="+mn-lt"/>
+        <a:ea typeface="+mn-ea"/>
+        <a:cs typeface="+mn-cs"/>
+      </a:defRPr>
+    </a:lvl2pPr>
+    <a:lvl3pPr marL="914400" algn="l" defTabSz="914400" rtl="0" eaLnBrk="1" latinLnBrk="0" hangingPunct="1">
+      <a:defRPr sz="1200" kern="1200">
+        <a:solidFill>
+          <a:schemeClr val="tx1"/>
+        </a:solidFill>
+        <a:latin typeface="+mn-lt"/>
+        <a:ea typeface="+mn-ea"/>
+        <a:cs typeface="+mn-cs"/>
+      </a:defRPr>
+    </a:lvl3pPr>
+    <a:lvl4pPr marL="1371600" algn="l" defTabSz="914400" rtl="0" eaLnBrk="1" latinLnBrk="0" hangingPunct="1">
+      <a:defRPr sz="1200" kern="1200">
+        <a:solidFill>
+          <a:schemeClr val="tx1"/>
+        </a:solidFill>
+        <a:latin typeface="+mn-lt"/>
+        <a:ea typeface="+mn-ea"/>
+        <a:cs typeface="+mn-cs"/>
+      </a:defRPr>
+    </a:lvl4pPr>
+    <a:lvl5pPr marL="1828800" algn="l" defTabSz="914400" rtl="0" eaLnBrk="1" latinLnBrk="0" hangingPunct="1">
+      <a:defRPr sz="1200" kern="1200">
+        <a:solidFill>
+          <a:schemeClr val="tx1"/>
+        </a:solidFill>
+        <a:latin typeface="+mn-lt"/>
+        <a:ea typeface="+mn-ea"/>
+        <a:cs typeface="+mn-cs"/>
+      </a:defRPr>
+    </a:lvl5pPr>
+    <a:lvl6pPr marL="2286000" algn="l" defTabSz="914400" rtl="0" eaLnBrk="1" latinLnBrk="0" hangingPunct="1">
+      <a:defRPr sz="1200" kern="1200">
+        <a:solidFill>
+          <a:schemeClr val="tx1"/>
+        </a:solidFill>
+        <a:latin typeface="+mn-lt"/>
+        <a:ea typeface="+mn-ea"/>
+        <a:cs typeface="+mn-cs"/>
+      </a:defRPr>
+    </a:lvl6pPr>
+    <a:lvl7pPr marL="2743200" algn="l" defTabSz="914400" rtl="0" eaLnBrk="1" latinLnBrk="0" hangingPunct="1">
+      <a:defRPr sz="1200" kern="1200">
+        <a:solidFill>
+          <a:schemeClr val="tx1"/>
+        </a:solidFill>
+        <a:latin typeface="+mn-lt"/>
+        <a:ea typeface="+mn-ea"/>
+        <a:cs typeface="+mn-cs"/>
+      </a:defRPr>
+    </a:lvl7pPr>
+    <a:lvl8pPr marL="3200400" algn="l" defTabSz="914400" rtl="0" eaLnBrk="1" latinLnBrk="0" hangingPunct="1">
+      <a:defRPr sz="1200" kern="1200">
+        <a:solidFill>
+          <a:schemeClr val="tx1"/>
+        </a:solidFill>
+        <a:latin typeface="+mn-lt"/>
+        <a:ea typeface="+mn-ea"/>
+        <a:cs typeface="+mn-cs"/>
+      </a:defRPr>
+    </a:lvl8pPr>
+    <a:lvl9pPr marL="3657600" algn="l" defTabSz="914400" rtl="0" eaLnBrk="1" latinLnBrk="0" hangingPunct="1">
+      <a:defRPr sz="1200" kern="1200">
+        <a:solidFill>
+          <a:schemeClr val="tx1"/>
+        </a:solidFill>
+        <a:latin typeface="+mn-lt"/>
+        <a:ea typeface="+mn-ea"/>
+        <a:cs typeface="+mn-cs"/>
+      </a:defRPr>
+    </a:lvl9pPr>
+  </p:notesStyle>
+</p:notesMaster>
+</file>
+
+<file path=ppt/notesSlides/notesSlide1.xml><?xml version="1.0" encoding="utf-8"?>
+<p:notes xmlns:a="http://schemas.openxmlformats.org/drawingml/2006/main" xmlns:r="http://schemas.openxmlformats.org/officeDocument/2006/relationships" xmlns:p="http://schemas.openxmlformats.org/presentationml/2006/main">
+  <p:cSld>
+    <p:spTree>
+      <p:nvGrpSpPr>
+        <p:cNvPr id="1" name=""/>
+        <p:cNvGrpSpPr/>
+        <p:nvPr/>
+      </p:nvGrpSpPr>
+      <p:grpSpPr>
+        <a:xfrm>
+          <a:off x="0" y="0"/>
+          <a:ext cx="0" cy="0"/>
+          <a:chOff x="0" y="0"/>
+          <a:chExt cx="0" cy="0"/>
+        </a:xfrm>
+      </p:grpSpPr>
+      <p:sp>
+        <p:nvSpPr>
+          <p:cNvPr id="2" name="Slide Image Placeholder 1"/>
+          <p:cNvSpPr>
+            <a:spLocks noGrp="1" noRot="1" noChangeAspect="1"/>
+          </p:cNvSpPr>
+          <p:nvPr>
+            <p:ph type="sldImg"/>
+          </p:nvPr>
+        </p:nvSpPr>
+        <p:spPr/>
+      </p:sp>
+      <p:sp>
+        <p:nvSpPr>
+          <p:cNvPr id="3" name="Notes Placeholder 2"/>
+          <p:cNvSpPr>
+            <a:spLocks noGrp="1"/>
+          </p:cNvSpPr>
+          <p:nvPr>
+            <p:ph type="body" idx="1"/>
+          </p:nvPr>
+        </p:nvSpPr>
+        <p:spPr/>
+        <p:txBody>
+          <a:bodyPr/>
+          <a:lstStyle/>
+          <a:p>
+            <a:endParaRPr lang="en-US"/>
+          </a:p>
+        </p:txBody>
+      </p:sp>
+      <p:sp>
+        <p:nvSpPr>
+          <p:cNvPr id="4" name="Slide Number Placeholder 3"/>
+          <p:cNvSpPr>
+            <a:spLocks noGrp="1"/>
+          </p:cNvSpPr>
+          <p:nvPr>
+            <p:ph type="sldNum" sz="quarter" idx="10"/>
+          </p:nvPr>
+        </p:nvSpPr>
+        <p:spPr/>
+        <p:txBody>
+          <a:bodyPr/>
+          <a:lstStyle/>
+          <a:p>
+            <a:fld id="{E56E9C0E-1013-446D-B4EA-A75F7BFEAF03}" type="slidenum">
+              <a:rPr lang="en-US" smtClean="0"/>
+              <a:t>31</a:t>
+            </a:fld>
+            <a:endParaRPr lang="en-US"/>
+          </a:p>
+        </p:txBody>
+      </p:sp>
+    </p:spTree>
+    <p:extLst>
+      <p:ext uri="{BB962C8B-B14F-4D97-AF65-F5344CB8AC3E}">
+        <p14:creationId xmlns:p14="http://schemas.microsoft.com/office/powerpoint/2010/main" val="4270606736"/>
+      </p:ext>
+    </p:extLst>
+  </p:cSld>
+  <p:clrMapOvr>
+    <a:masterClrMapping/>
+  </p:clrMapOvr>
+</p:notes>
 </file>
 
 <file path=ppt/slideLayouts/slideLayout1.xml><?xml version="1.0" encoding="utf-8"?>
@@ -5683,7 +6122,7 @@
           <a:p>
             <a:r>
               <a:rPr lang="en-US" dirty="0" smtClean="0"/>
-              <a:t>②Analysis lifecycle: prepare/post group</a:t>
+              <a:t>②Testing: CellProfiler unit tests</a:t>
             </a:r>
             <a:endParaRPr lang="en-US" dirty="0"/>
           </a:p>
@@ -5699,104 +6138,45 @@
             <p:ph idx="1"/>
           </p:nvPr>
         </p:nvSpPr>
-        <p:spPr>
-          <a:xfrm>
-            <a:off x="457200" y="1508760"/>
-            <a:ext cx="8229600" cy="4815840"/>
-          </a:xfrm>
-        </p:spPr>
+        <p:spPr/>
         <p:txBody>
-          <a:bodyPr>
-            <a:normAutofit fontScale="92500" lnSpcReduction="10000"/>
-          </a:bodyPr>
+          <a:bodyPr/>
           <a:lstStyle/>
           <a:p>
             <a:r>
               <a:rPr lang="en-US" dirty="0" smtClean="0"/>
-              <a:t>Groups: aggregate over image sets</a:t>
-            </a:r>
-          </a:p>
-          <a:p>
-            <a:pPr lvl="1"/>
-            <a:r>
-              <a:rPr lang="en-US" dirty="0" err="1" smtClean="0"/>
-              <a:t>prepare_group</a:t>
-            </a:r>
-            <a:r>
-              <a:rPr lang="en-US" dirty="0" smtClean="0"/>
-              <a:t> – initialize for aggregation</a:t>
-            </a:r>
-          </a:p>
-          <a:p>
-            <a:pPr lvl="1"/>
-            <a:r>
-              <a:rPr lang="en-US" dirty="0" smtClean="0"/>
-              <a:t>Run – accumulate per cycle</a:t>
-            </a:r>
-          </a:p>
-          <a:p>
-            <a:pPr lvl="1"/>
-            <a:r>
-              <a:rPr lang="en-US" dirty="0" smtClean="0"/>
-              <a:t>Finalize the aggregation in run() on the last cycle or in </a:t>
-            </a:r>
-            <a:r>
-              <a:rPr lang="en-US" dirty="0" err="1" smtClean="0"/>
-              <a:t>post_group</a:t>
-            </a:r>
-            <a:endParaRPr lang="en-US" dirty="0" smtClean="0"/>
-          </a:p>
-          <a:p>
-            <a:pPr lvl="1"/>
-            <a:r>
-              <a:rPr lang="en-US" dirty="0" err="1" smtClean="0"/>
-              <a:t>GroupNumber</a:t>
-            </a:r>
-            <a:r>
-              <a:rPr lang="en-US" dirty="0" smtClean="0"/>
-              <a:t> image meas. same for all cycles in group</a:t>
-            </a:r>
-          </a:p>
-          <a:p>
-            <a:pPr lvl="1"/>
-            <a:r>
-              <a:rPr lang="en-US" dirty="0" err="1" smtClean="0"/>
-              <a:t>GroupIndex</a:t>
-            </a:r>
-            <a:r>
-              <a:rPr lang="en-US" dirty="0" smtClean="0"/>
-              <a:t> image meas. = 1 -&gt; # cycles in group</a:t>
-            </a:r>
-          </a:p>
-          <a:p>
-            <a:pPr lvl="1"/>
-            <a:r>
-              <a:rPr lang="en-US" dirty="0" smtClean="0"/>
-              <a:t>Use the module’s dictionary to store state</a:t>
-            </a:r>
-          </a:p>
-          <a:p>
-            <a:pPr lvl="1"/>
-            <a:r>
-              <a:rPr lang="en-US" dirty="0" smtClean="0"/>
-              <a:t>Groups</a:t>
-            </a:r>
-          </a:p>
-          <a:p>
-            <a:r>
-              <a:rPr lang="en-US" dirty="0" smtClean="0"/>
-              <a:t>Uses of groups</a:t>
-            </a:r>
-          </a:p>
-          <a:p>
-            <a:pPr lvl="1"/>
-            <a:r>
-              <a:rPr lang="en-US" dirty="0" smtClean="0"/>
-              <a:t>Producing an aggregate image (z-</a:t>
-            </a:r>
-            <a:r>
-              <a:rPr lang="en-US" dirty="0" err="1" smtClean="0"/>
-              <a:t>projecction</a:t>
+              <a:t>Python </a:t>
+            </a:r>
+            <a:r>
+              <a:rPr lang="en-US" dirty="0" err="1" smtClean="0"/>
+              <a:t>unittest</a:t>
+            </a:r>
+            <a:r>
+              <a:rPr lang="en-US" dirty="0" smtClean="0"/>
+              <a:t> package</a:t>
+            </a:r>
+          </a:p>
+          <a:p>
+            <a:pPr lvl="1"/>
+            <a:r>
+              <a:rPr lang="en-US" dirty="0"/>
+              <a:t>c</a:t>
+            </a:r>
+            <a:r>
+              <a:rPr lang="en-US" dirty="0" smtClean="0"/>
+              <a:t>lass </a:t>
+            </a:r>
+            <a:r>
+              <a:rPr lang="en-US" dirty="0" err="1" smtClean="0"/>
+              <a:t>MyTest</a:t>
+            </a:r>
+            <a:r>
+              <a:rPr lang="en-US" dirty="0" smtClean="0"/>
+              <a:t>(</a:t>
+            </a:r>
+            <a:r>
+              <a:rPr lang="en-US" dirty="0" err="1" smtClean="0"/>
+              <a:t>unittest.TestCase</a:t>
             </a:r>
             <a:r>
               <a:rPr lang="en-US" dirty="0" smtClean="0"/>
@@ -5806,39 +6186,87 @@
           <a:p>
             <a:pPr lvl="1"/>
             <a:r>
-              <a:rPr lang="en-US" dirty="0" smtClean="0"/>
-              <a:t>Treating groups as mini-analyses (e.g. 1 </a:t>
-            </a:r>
-            <a:r>
-              <a:rPr lang="en-US" dirty="0" err="1" smtClean="0"/>
-              <a:t>csv</a:t>
-            </a:r>
-            <a:r>
-              <a:rPr lang="en-US" dirty="0" smtClean="0"/>
-              <a:t> per group)</a:t>
-            </a:r>
-          </a:p>
-          <a:p>
-            <a:pPr lvl="1"/>
-            <a:r>
-              <a:rPr lang="en-US" dirty="0" smtClean="0"/>
-              <a:t>Performing an aggregate analysis at end (e.g. </a:t>
-            </a:r>
-            <a:r>
-              <a:rPr lang="en-US" dirty="0" err="1" smtClean="0"/>
-              <a:t>TrackObjects</a:t>
-            </a:r>
-            <a:r>
-              <a:rPr lang="en-US" dirty="0" smtClean="0"/>
-              <a:t>)</a:t>
+              <a:rPr lang="en-US" dirty="0" err="1"/>
+              <a:t>d</a:t>
+            </a:r>
+            <a:r>
+              <a:rPr lang="en-US" dirty="0" err="1" smtClean="0"/>
+              <a:t>ef</a:t>
+            </a:r>
+            <a:r>
+              <a:rPr lang="en-US" dirty="0" smtClean="0"/>
+              <a:t> </a:t>
+            </a:r>
+            <a:r>
+              <a:rPr lang="en-US" b="1" dirty="0" err="1" smtClean="0"/>
+              <a:t>test_</a:t>
+            </a:r>
+            <a:r>
+              <a:rPr lang="en-US" dirty="0" err="1" smtClean="0"/>
+              <a:t>whatever</a:t>
+            </a:r>
+            <a:r>
+              <a:rPr lang="en-US" dirty="0" smtClean="0"/>
+              <a:t>(self) = test to run</a:t>
+            </a:r>
+          </a:p>
+          <a:p>
+            <a:pPr lvl="1"/>
+            <a:r>
+              <a:rPr lang="en-US" dirty="0" smtClean="0"/>
+              <a:t>Tests run in alphabetical order: test_01_01 &lt; test_01_02</a:t>
+            </a:r>
+          </a:p>
+          <a:p>
+            <a:r>
+              <a:rPr lang="en-US" dirty="0" smtClean="0"/>
+              <a:t>Things to test</a:t>
+            </a:r>
+          </a:p>
+          <a:p>
+            <a:pPr lvl="1"/>
+            <a:r>
+              <a:rPr lang="en-US" dirty="0" smtClean="0"/>
+              <a:t>Load a pipeline that contains your module</a:t>
+            </a:r>
+          </a:p>
+          <a:p>
+            <a:pPr lvl="1"/>
+            <a:r>
+              <a:rPr lang="en-US" dirty="0" smtClean="0"/>
+              <a:t>Create typical test inputs, compare outputs against expected</a:t>
+            </a:r>
+          </a:p>
+          <a:p>
+            <a:pPr lvl="1"/>
+            <a:r>
+              <a:rPr lang="en-US" dirty="0" smtClean="0"/>
+              <a:t>Corner cases that historically crash CellProfiler</a:t>
             </a:r>
           </a:p>
           <a:p>
             <a:pPr lvl="2"/>
             <a:r>
               <a:rPr lang="en-US" dirty="0" smtClean="0"/>
-              <a:t>But think about doing this outside of CellProfiler</a:t>
-            </a:r>
+              <a:t>Totally masked images</a:t>
+            </a:r>
+          </a:p>
+          <a:p>
+            <a:pPr lvl="2"/>
+            <a:r>
+              <a:rPr lang="en-US" dirty="0" smtClean="0"/>
+              <a:t>No objects</a:t>
+            </a:r>
+          </a:p>
+          <a:p>
+            <a:pPr lvl="2"/>
+            <a:r>
+              <a:rPr lang="en-US" dirty="0" smtClean="0"/>
+              <a:t>Images of different sizes</a:t>
+            </a:r>
+          </a:p>
+          <a:p>
+            <a:pPr lvl="1"/>
             <a:endParaRPr lang="en-US" dirty="0"/>
           </a:p>
         </p:txBody>
@@ -5846,13 +6274,20 @@
     </p:spTree>
     <p:extLst>
       <p:ext uri="{BB962C8B-B14F-4D97-AF65-F5344CB8AC3E}">
-        <p14:creationId xmlns:p14="http://schemas.microsoft.com/office/powerpoint/2010/main" val="3447945287"/>
+        <p14:creationId xmlns:p14="http://schemas.microsoft.com/office/powerpoint/2010/main" val="4075788779"/>
       </p:ext>
     </p:extLst>
   </p:cSld>
   <p:clrMapOvr>
     <a:masterClrMapping/>
   </p:clrMapOvr>
+  <p:timing>
+    <p:tnLst>
+      <p:par>
+        <p:cTn id="1" dur="indefinite" restart="never" nodeType="tmRoot"/>
+      </p:par>
+    </p:tnLst>
+  </p:timing>
 </p:sld>
 </file>
 
@@ -5890,11 +6325,7 @@
           <a:p>
             <a:r>
               <a:rPr lang="en-US" dirty="0" smtClean="0"/>
-              <a:t>②Analysis Lifecycle: </a:t>
-            </a:r>
-            <a:r>
-              <a:rPr lang="en-US" dirty="0" err="1" smtClean="0"/>
-              <a:t>prepare_group</a:t>
+              <a:t>②test_example5a – adding a test</a:t>
             </a:r>
             <a:endParaRPr lang="en-US" dirty="0"/>
           </a:p>
@@ -5917,101 +6348,516 @@
           <a:p>
             <a:r>
               <a:rPr lang="en-US" dirty="0" smtClean="0"/>
-              <a:t>Prepare group runs before any of the group’s cycles</a:t>
-            </a:r>
-          </a:p>
-          <a:p>
-            <a:pPr lvl="1"/>
-            <a:r>
-              <a:rPr lang="en-US" dirty="0" smtClean="0"/>
-              <a:t>In current code base = always</a:t>
-            </a:r>
-          </a:p>
-          <a:p>
-            <a:pPr lvl="1"/>
-            <a:r>
-              <a:rPr lang="en-US" dirty="0" smtClean="0"/>
-              <a:t>In multiprocessing, if a module is an aggregation module</a:t>
-            </a:r>
-          </a:p>
-          <a:p>
-            <a:pPr lvl="2"/>
-            <a:r>
-              <a:rPr lang="en-US" dirty="0" err="1" smtClean="0"/>
-              <a:t>CPModule.is_aggregation_module</a:t>
-            </a:r>
-            <a:r>
-              <a:rPr lang="en-US" dirty="0" smtClean="0"/>
-              <a:t> returns True </a:t>
-            </a:r>
-          </a:p>
-          <a:p>
-            <a:r>
-              <a:rPr lang="en-US" dirty="0" err="1"/>
-              <a:t>p</a:t>
-            </a:r>
-            <a:r>
-              <a:rPr lang="en-US" dirty="0" err="1" smtClean="0"/>
-              <a:t>repare_group</a:t>
-            </a:r>
-            <a:r>
-              <a:rPr lang="en-US" dirty="0" smtClean="0"/>
-              <a:t> arguments</a:t>
-            </a:r>
-          </a:p>
-          <a:p>
-            <a:pPr lvl="1"/>
-            <a:r>
-              <a:rPr lang="en-US" dirty="0"/>
-              <a:t>w</a:t>
-            </a:r>
-            <a:r>
-              <a:rPr lang="en-US" dirty="0" smtClean="0"/>
-              <a:t>orkspace</a:t>
-            </a:r>
-          </a:p>
-          <a:p>
-            <a:pPr lvl="2"/>
-            <a:r>
-              <a:rPr lang="en-US" dirty="0" smtClean="0"/>
-              <a:t>Only measurements and pipeline are valid</a:t>
-            </a:r>
-          </a:p>
-          <a:p>
-            <a:pPr lvl="1"/>
-            <a:r>
-              <a:rPr lang="en-US" dirty="0"/>
-              <a:t>g</a:t>
-            </a:r>
-            <a:r>
-              <a:rPr lang="en-US" dirty="0" smtClean="0"/>
-              <a:t>rouping – the metadata tags used for grouping (legacy)</a:t>
-            </a:r>
-          </a:p>
-          <a:p>
-            <a:pPr lvl="1"/>
-            <a:r>
-              <a:rPr lang="en-US" dirty="0" err="1" smtClean="0"/>
-              <a:t>image_numbers</a:t>
-            </a:r>
-            <a:r>
-              <a:rPr lang="en-US" dirty="0" smtClean="0"/>
-              <a:t> – the image numbers for the cycles in the group.</a:t>
-            </a:r>
-            <a:endParaRPr lang="en-US" dirty="0"/>
+              <a:t>Test pipeline loading of example5a</a:t>
+            </a:r>
+          </a:p>
+          <a:p>
+            <a:pPr lvl="1">
+              <a:spcBef>
+                <a:spcPts val="0"/>
+              </a:spcBef>
+            </a:pPr>
+            <a:r>
+              <a:rPr lang="en-US" dirty="0" smtClean="0"/>
+              <a:t>Recipe for making a </a:t>
+            </a:r>
+            <a:r>
+              <a:rPr lang="en-US" smtClean="0"/>
+              <a:t>pipeline file:</a:t>
+            </a:r>
+            <a:r>
+              <a:rPr lang="en-US" dirty="0" smtClean="0"/>
+              <a:t/>
+            </a:r>
+            <a:br>
+              <a:rPr lang="en-US" dirty="0" smtClean="0"/>
+            </a:br>
+            <a:r>
+              <a:rPr lang="en-US" sz="1600" dirty="0" smtClean="0">
+                <a:solidFill>
+                  <a:srgbClr val="00B050"/>
+                </a:solidFill>
+                <a:latin typeface="Courier New" pitchFamily="49" charset="0"/>
+                <a:cs typeface="Courier New" pitchFamily="49" charset="0"/>
+              </a:rPr>
+              <a:t>from </a:t>
+            </a:r>
+            <a:r>
+              <a:rPr lang="en-US" sz="1600" dirty="0" err="1" smtClean="0">
+                <a:solidFill>
+                  <a:srgbClr val="00B050"/>
+                </a:solidFill>
+                <a:latin typeface="Courier New" pitchFamily="49" charset="0"/>
+                <a:cs typeface="Courier New" pitchFamily="49" charset="0"/>
+              </a:rPr>
+              <a:t>cellprofiler.modules</a:t>
+            </a:r>
+            <a:r>
+              <a:rPr lang="en-US" sz="1600" dirty="0" smtClean="0">
+                <a:solidFill>
+                  <a:srgbClr val="00B050"/>
+                </a:solidFill>
+                <a:latin typeface="Courier New" pitchFamily="49" charset="0"/>
+                <a:cs typeface="Courier New" pitchFamily="49" charset="0"/>
+              </a:rPr>
+              <a:t> import </a:t>
+            </a:r>
+            <a:r>
+              <a:rPr lang="en-US" sz="1600" dirty="0" err="1" smtClean="0">
+                <a:solidFill>
+                  <a:srgbClr val="00B050"/>
+                </a:solidFill>
+                <a:latin typeface="Courier New" pitchFamily="49" charset="0"/>
+                <a:cs typeface="Courier New" pitchFamily="49" charset="0"/>
+              </a:rPr>
+              <a:t>instantiate_module</a:t>
+            </a:r>
+            <a:r>
+              <a:rPr lang="en-US" sz="1600" dirty="0" smtClean="0">
+                <a:solidFill>
+                  <a:srgbClr val="00B050"/>
+                </a:solidFill>
+                <a:latin typeface="Courier New" pitchFamily="49" charset="0"/>
+                <a:cs typeface="Courier New" pitchFamily="49" charset="0"/>
+              </a:rPr>
+              <a:t/>
+            </a:r>
+            <a:br>
+              <a:rPr lang="en-US" sz="1600" dirty="0" smtClean="0">
+                <a:solidFill>
+                  <a:srgbClr val="00B050"/>
+                </a:solidFill>
+                <a:latin typeface="Courier New" pitchFamily="49" charset="0"/>
+                <a:cs typeface="Courier New" pitchFamily="49" charset="0"/>
+              </a:rPr>
+            </a:br>
+            <a:r>
+              <a:rPr lang="en-US" sz="1600" dirty="0" smtClean="0">
+                <a:solidFill>
+                  <a:srgbClr val="00B050"/>
+                </a:solidFill>
+                <a:latin typeface="Courier New" pitchFamily="49" charset="0"/>
+                <a:cs typeface="Courier New" pitchFamily="49" charset="0"/>
+              </a:rPr>
+              <a:t>from </a:t>
+            </a:r>
+            <a:r>
+              <a:rPr lang="en-US" sz="1600" dirty="0" err="1" smtClean="0">
+                <a:solidFill>
+                  <a:srgbClr val="00B050"/>
+                </a:solidFill>
+                <a:latin typeface="Courier New" pitchFamily="49" charset="0"/>
+                <a:cs typeface="Courier New" pitchFamily="49" charset="0"/>
+              </a:rPr>
+              <a:t>cellprofiler.pipeline</a:t>
+            </a:r>
+            <a:r>
+              <a:rPr lang="en-US" sz="1600" dirty="0" smtClean="0">
+                <a:solidFill>
+                  <a:srgbClr val="00B050"/>
+                </a:solidFill>
+                <a:latin typeface="Courier New" pitchFamily="49" charset="0"/>
+                <a:cs typeface="Courier New" pitchFamily="49" charset="0"/>
+              </a:rPr>
+              <a:t> import Pipeline</a:t>
+            </a:r>
+            <a:br>
+              <a:rPr lang="en-US" sz="1600" dirty="0" smtClean="0">
+                <a:solidFill>
+                  <a:srgbClr val="00B050"/>
+                </a:solidFill>
+                <a:latin typeface="Courier New" pitchFamily="49" charset="0"/>
+                <a:cs typeface="Courier New" pitchFamily="49" charset="0"/>
+              </a:rPr>
+            </a:br>
+            <a:r>
+              <a:rPr lang="en-US" sz="1600" dirty="0" smtClean="0">
+                <a:solidFill>
+                  <a:srgbClr val="00B050"/>
+                </a:solidFill>
+                <a:latin typeface="Courier New" pitchFamily="49" charset="0"/>
+                <a:cs typeface="Courier New" pitchFamily="49" charset="0"/>
+              </a:rPr>
+              <a:t>module = </a:t>
+            </a:r>
+            <a:r>
+              <a:rPr lang="en-US" sz="1600" dirty="0" err="1" smtClean="0">
+                <a:solidFill>
+                  <a:srgbClr val="00B050"/>
+                </a:solidFill>
+                <a:latin typeface="Courier New" pitchFamily="49" charset="0"/>
+                <a:cs typeface="Courier New" pitchFamily="49" charset="0"/>
+              </a:rPr>
+              <a:t>instantiate_module</a:t>
+            </a:r>
+            <a:r>
+              <a:rPr lang="en-US" sz="1600" dirty="0" smtClean="0">
+                <a:solidFill>
+                  <a:srgbClr val="00B050"/>
+                </a:solidFill>
+                <a:latin typeface="Courier New" pitchFamily="49" charset="0"/>
+                <a:cs typeface="Courier New" pitchFamily="49" charset="0"/>
+              </a:rPr>
+              <a:t>(“Example5a”)</a:t>
+            </a:r>
+            <a:br>
+              <a:rPr lang="en-US" sz="1600" dirty="0" smtClean="0">
+                <a:solidFill>
+                  <a:srgbClr val="00B050"/>
+                </a:solidFill>
+                <a:latin typeface="Courier New" pitchFamily="49" charset="0"/>
+                <a:cs typeface="Courier New" pitchFamily="49" charset="0"/>
+              </a:rPr>
+            </a:br>
+            <a:r>
+              <a:rPr lang="en-US" sz="1600" dirty="0" err="1" smtClean="0">
+                <a:solidFill>
+                  <a:srgbClr val="00B050"/>
+                </a:solidFill>
+                <a:latin typeface="Courier New" pitchFamily="49" charset="0"/>
+                <a:cs typeface="Courier New" pitchFamily="49" charset="0"/>
+              </a:rPr>
+              <a:t>module.module_num</a:t>
+            </a:r>
+            <a:r>
+              <a:rPr lang="en-US" sz="1600" dirty="0" smtClean="0">
+                <a:solidFill>
+                  <a:srgbClr val="00B050"/>
+                </a:solidFill>
+                <a:latin typeface="Courier New" pitchFamily="49" charset="0"/>
+                <a:cs typeface="Courier New" pitchFamily="49" charset="0"/>
+              </a:rPr>
+              <a:t> = 1</a:t>
+            </a:r>
+            <a:br>
+              <a:rPr lang="en-US" sz="1600" dirty="0" smtClean="0">
+                <a:solidFill>
+                  <a:srgbClr val="00B050"/>
+                </a:solidFill>
+                <a:latin typeface="Courier New" pitchFamily="49" charset="0"/>
+                <a:cs typeface="Courier New" pitchFamily="49" charset="0"/>
+              </a:rPr>
+            </a:br>
+            <a:r>
+              <a:rPr lang="en-US" sz="1600" dirty="0" smtClean="0">
+                <a:solidFill>
+                  <a:srgbClr val="00B050"/>
+                </a:solidFill>
+                <a:latin typeface="Courier New" pitchFamily="49" charset="0"/>
+                <a:cs typeface="Courier New" pitchFamily="49" charset="0"/>
+              </a:rPr>
+              <a:t>pipeline = Pipeline()</a:t>
+            </a:r>
+            <a:br>
+              <a:rPr lang="en-US" sz="1600" dirty="0" smtClean="0">
+                <a:solidFill>
+                  <a:srgbClr val="00B050"/>
+                </a:solidFill>
+                <a:latin typeface="Courier New" pitchFamily="49" charset="0"/>
+                <a:cs typeface="Courier New" pitchFamily="49" charset="0"/>
+              </a:rPr>
+            </a:br>
+            <a:r>
+              <a:rPr lang="en-US" sz="1600" dirty="0" err="1" smtClean="0">
+                <a:solidFill>
+                  <a:srgbClr val="00B050"/>
+                </a:solidFill>
+                <a:latin typeface="Courier New" pitchFamily="49" charset="0"/>
+                <a:cs typeface="Courier New" pitchFamily="49" charset="0"/>
+              </a:rPr>
+              <a:t>pipeline.add_module</a:t>
+            </a:r>
+            <a:r>
+              <a:rPr lang="en-US" sz="1600" dirty="0" smtClean="0">
+                <a:solidFill>
+                  <a:srgbClr val="00B050"/>
+                </a:solidFill>
+                <a:latin typeface="Courier New" pitchFamily="49" charset="0"/>
+                <a:cs typeface="Courier New" pitchFamily="49" charset="0"/>
+              </a:rPr>
+              <a:t>(module)</a:t>
+            </a:r>
+            <a:br>
+              <a:rPr lang="en-US" sz="1600" dirty="0" smtClean="0">
+                <a:solidFill>
+                  <a:srgbClr val="00B050"/>
+                </a:solidFill>
+                <a:latin typeface="Courier New" pitchFamily="49" charset="0"/>
+                <a:cs typeface="Courier New" pitchFamily="49" charset="0"/>
+              </a:rPr>
+            </a:br>
+            <a:r>
+              <a:rPr lang="en-US" sz="1600" dirty="0" err="1" smtClean="0">
+                <a:solidFill>
+                  <a:srgbClr val="00B050"/>
+                </a:solidFill>
+                <a:latin typeface="Courier New" pitchFamily="49" charset="0"/>
+                <a:cs typeface="Courier New" pitchFamily="49" charset="0"/>
+              </a:rPr>
+              <a:t>pipeline.savetxt</a:t>
+            </a:r>
+            <a:r>
+              <a:rPr lang="en-US" sz="1600" dirty="0" smtClean="0">
+                <a:solidFill>
+                  <a:srgbClr val="00B050"/>
+                </a:solidFill>
+                <a:latin typeface="Courier New" pitchFamily="49" charset="0"/>
+                <a:cs typeface="Courier New" pitchFamily="49" charset="0"/>
+              </a:rPr>
+              <a:t>(</a:t>
+            </a:r>
+            <a:br>
+              <a:rPr lang="en-US" sz="1600" dirty="0" smtClean="0">
+                <a:solidFill>
+                  <a:srgbClr val="00B050"/>
+                </a:solidFill>
+                <a:latin typeface="Courier New" pitchFamily="49" charset="0"/>
+                <a:cs typeface="Courier New" pitchFamily="49" charset="0"/>
+              </a:rPr>
+            </a:br>
+            <a:r>
+              <a:rPr lang="en-US" sz="1600" dirty="0" smtClean="0">
+                <a:solidFill>
+                  <a:srgbClr val="00B050"/>
+                </a:solidFill>
+                <a:latin typeface="Courier New" pitchFamily="49" charset="0"/>
+                <a:cs typeface="Courier New" pitchFamily="49" charset="0"/>
+              </a:rPr>
+              <a:t>    “&lt;my-file-name&gt;”, </a:t>
+            </a:r>
+            <a:r>
+              <a:rPr lang="en-US" sz="1600" dirty="0" err="1" smtClean="0">
+                <a:solidFill>
+                  <a:srgbClr val="00B050"/>
+                </a:solidFill>
+                <a:latin typeface="Courier New" pitchFamily="49" charset="0"/>
+                <a:cs typeface="Courier New" pitchFamily="49" charset="0"/>
+              </a:rPr>
+              <a:t>save_image_plane_details</a:t>
+            </a:r>
+            <a:r>
+              <a:rPr lang="en-US" sz="1600" dirty="0" smtClean="0">
+                <a:solidFill>
+                  <a:srgbClr val="00B050"/>
+                </a:solidFill>
+                <a:latin typeface="Courier New" pitchFamily="49" charset="0"/>
+                <a:cs typeface="Courier New" pitchFamily="49" charset="0"/>
+              </a:rPr>
+              <a:t>=False)</a:t>
+            </a:r>
+          </a:p>
+          <a:p>
+            <a:pPr lvl="1">
+              <a:spcBef>
+                <a:spcPts val="0"/>
+              </a:spcBef>
+            </a:pPr>
+            <a:r>
+              <a:rPr lang="en-US" dirty="0" smtClean="0">
+                <a:cs typeface="Courier New" pitchFamily="49" charset="0"/>
+              </a:rPr>
+              <a:t>Recipe for loading a pipeline:</a:t>
+            </a:r>
+            <a:br>
+              <a:rPr lang="en-US" dirty="0" smtClean="0">
+                <a:cs typeface="Courier New" pitchFamily="49" charset="0"/>
+              </a:rPr>
+            </a:br>
+            <a:r>
+              <a:rPr lang="en-US" sz="1600" dirty="0" smtClean="0">
+                <a:solidFill>
+                  <a:srgbClr val="00B050"/>
+                </a:solidFill>
+                <a:latin typeface="Courier New" pitchFamily="49" charset="0"/>
+                <a:cs typeface="Courier New" pitchFamily="49" charset="0"/>
+              </a:rPr>
+              <a:t>from </a:t>
+            </a:r>
+            <a:r>
+              <a:rPr lang="en-US" sz="1600" dirty="0" err="1" smtClean="0">
+                <a:solidFill>
+                  <a:srgbClr val="00B050"/>
+                </a:solidFill>
+                <a:latin typeface="Courier New" pitchFamily="49" charset="0"/>
+                <a:cs typeface="Courier New" pitchFamily="49" charset="0"/>
+              </a:rPr>
+              <a:t>cStringIO</a:t>
+            </a:r>
+            <a:r>
+              <a:rPr lang="en-US" sz="1600" dirty="0" smtClean="0">
+                <a:solidFill>
+                  <a:srgbClr val="00B050"/>
+                </a:solidFill>
+                <a:latin typeface="Courier New" pitchFamily="49" charset="0"/>
+                <a:cs typeface="Courier New" pitchFamily="49" charset="0"/>
+              </a:rPr>
+              <a:t> import </a:t>
+            </a:r>
+            <a:r>
+              <a:rPr lang="en-US" sz="1600" dirty="0" err="1" smtClean="0">
+                <a:solidFill>
+                  <a:srgbClr val="00B050"/>
+                </a:solidFill>
+                <a:latin typeface="Courier New" pitchFamily="49" charset="0"/>
+                <a:cs typeface="Courier New" pitchFamily="49" charset="0"/>
+              </a:rPr>
+              <a:t>StringIO</a:t>
+            </a:r>
+            <a:r>
+              <a:rPr lang="en-US" sz="1600" dirty="0" smtClean="0">
+                <a:solidFill>
+                  <a:srgbClr val="00B050"/>
+                </a:solidFill>
+                <a:latin typeface="Courier New" pitchFamily="49" charset="0"/>
+                <a:cs typeface="Courier New" pitchFamily="49" charset="0"/>
+              </a:rPr>
+              <a:t/>
+            </a:r>
+            <a:br>
+              <a:rPr lang="en-US" sz="1600" dirty="0" smtClean="0">
+                <a:solidFill>
+                  <a:srgbClr val="00B050"/>
+                </a:solidFill>
+                <a:latin typeface="Courier New" pitchFamily="49" charset="0"/>
+                <a:cs typeface="Courier New" pitchFamily="49" charset="0"/>
+              </a:rPr>
+            </a:br>
+            <a:r>
+              <a:rPr lang="en-US" sz="1600" dirty="0" smtClean="0">
+                <a:solidFill>
+                  <a:srgbClr val="00B050"/>
+                </a:solidFill>
+                <a:latin typeface="Courier New" pitchFamily="49" charset="0"/>
+                <a:cs typeface="Courier New" pitchFamily="49" charset="0"/>
+              </a:rPr>
+              <a:t>data = r”””&lt;paste contents of my-file-name here”””</a:t>
+            </a:r>
+            <a:br>
+              <a:rPr lang="en-US" sz="1600" dirty="0" smtClean="0">
+                <a:solidFill>
+                  <a:srgbClr val="00B050"/>
+                </a:solidFill>
+                <a:latin typeface="Courier New" pitchFamily="49" charset="0"/>
+                <a:cs typeface="Courier New" pitchFamily="49" charset="0"/>
+              </a:rPr>
+            </a:br>
+            <a:r>
+              <a:rPr lang="en-US" sz="1600" dirty="0" smtClean="0">
+                <a:solidFill>
+                  <a:srgbClr val="00B050"/>
+                </a:solidFill>
+                <a:latin typeface="Courier New" pitchFamily="49" charset="0"/>
+                <a:cs typeface="Courier New" pitchFamily="49" charset="0"/>
+              </a:rPr>
+              <a:t>pipeline = Pipeline()</a:t>
+            </a:r>
+            <a:br>
+              <a:rPr lang="en-US" sz="1600" dirty="0" smtClean="0">
+                <a:solidFill>
+                  <a:srgbClr val="00B050"/>
+                </a:solidFill>
+                <a:latin typeface="Courier New" pitchFamily="49" charset="0"/>
+                <a:cs typeface="Courier New" pitchFamily="49" charset="0"/>
+              </a:rPr>
+            </a:br>
+            <a:r>
+              <a:rPr lang="en-US" sz="1600" dirty="0" err="1" smtClean="0">
+                <a:solidFill>
+                  <a:srgbClr val="00B050"/>
+                </a:solidFill>
+                <a:latin typeface="Courier New" pitchFamily="49" charset="0"/>
+                <a:cs typeface="Courier New" pitchFamily="49" charset="0"/>
+              </a:rPr>
+              <a:t>pipeline.load</a:t>
+            </a:r>
+            <a:r>
+              <a:rPr lang="en-US" sz="1600" dirty="0" smtClean="0">
+                <a:solidFill>
+                  <a:srgbClr val="00B050"/>
+                </a:solidFill>
+                <a:latin typeface="Courier New" pitchFamily="49" charset="0"/>
+                <a:cs typeface="Courier New" pitchFamily="49" charset="0"/>
+              </a:rPr>
+              <a:t>(</a:t>
+            </a:r>
+            <a:r>
+              <a:rPr lang="en-US" sz="1600" dirty="0" err="1" smtClean="0">
+                <a:solidFill>
+                  <a:srgbClr val="00B050"/>
+                </a:solidFill>
+                <a:latin typeface="Courier New" pitchFamily="49" charset="0"/>
+                <a:cs typeface="Courier New" pitchFamily="49" charset="0"/>
+              </a:rPr>
+              <a:t>StringIO</a:t>
+            </a:r>
+            <a:r>
+              <a:rPr lang="en-US" sz="1600" dirty="0" smtClean="0">
+                <a:solidFill>
+                  <a:srgbClr val="00B050"/>
+                </a:solidFill>
+                <a:latin typeface="Courier New" pitchFamily="49" charset="0"/>
+                <a:cs typeface="Courier New" pitchFamily="49" charset="0"/>
+              </a:rPr>
+              <a:t>(data))</a:t>
+            </a:r>
+          </a:p>
+          <a:p>
+            <a:pPr>
+              <a:spcBef>
+                <a:spcPts val="0"/>
+              </a:spcBef>
+            </a:pPr>
+            <a:r>
+              <a:rPr lang="en-US" dirty="0" smtClean="0">
+                <a:cs typeface="Courier New" pitchFamily="49" charset="0"/>
+              </a:rPr>
+              <a:t>Edit tutorial/tests/test_example5a.py</a:t>
+            </a:r>
+          </a:p>
+          <a:p>
+            <a:pPr>
+              <a:spcBef>
+                <a:spcPts val="0"/>
+              </a:spcBef>
+            </a:pPr>
+            <a:r>
+              <a:rPr lang="en-US" dirty="0" smtClean="0">
+                <a:cs typeface="Courier New" pitchFamily="49" charset="0"/>
+              </a:rPr>
+              <a:t>Make test_02_01_load(self):</a:t>
+            </a:r>
+            <a:br>
+              <a:rPr lang="en-US" dirty="0" smtClean="0">
+                <a:cs typeface="Courier New" pitchFamily="49" charset="0"/>
+              </a:rPr>
+            </a:br>
+            <a:endParaRPr lang="en-US" sz="1600" dirty="0" smtClean="0">
+              <a:solidFill>
+                <a:srgbClr val="00B050"/>
+              </a:solidFill>
+              <a:latin typeface="Courier New" pitchFamily="49" charset="0"/>
+              <a:cs typeface="Courier New" pitchFamily="49" charset="0"/>
+            </a:endParaRPr>
           </a:p>
         </p:txBody>
       </p:sp>
     </p:spTree>
     <p:extLst>
       <p:ext uri="{BB962C8B-B14F-4D97-AF65-F5344CB8AC3E}">
-        <p14:creationId xmlns:p14="http://schemas.microsoft.com/office/powerpoint/2010/main" val="870744099"/>
+        <p14:creationId xmlns:p14="http://schemas.microsoft.com/office/powerpoint/2010/main" val="1279695976"/>
       </p:ext>
     </p:extLst>
   </p:cSld>
   <p:clrMapOvr>
     <a:masterClrMapping/>
   </p:clrMapOvr>
+  <p:timing>
+    <p:tnLst>
+      <p:par>
+        <p:cTn id="1" dur="indefinite" restart="never" nodeType="tmRoot"/>
+      </p:par>
+    </p:tnLst>
+  </p:timing>
 </p:sld>
 </file>
 
@@ -6049,11 +6895,7 @@
           <a:p>
             <a:r>
               <a:rPr lang="en-US" dirty="0" smtClean="0"/>
-              <a:t>②Analysis Lifecycle: </a:t>
-            </a:r>
-            <a:r>
-              <a:rPr lang="en-US" dirty="0" err="1" smtClean="0"/>
-              <a:t>post_group</a:t>
+              <a:t>②Analysis lifecycle: prepare/post group</a:t>
             </a:r>
             <a:endParaRPr lang="en-US" dirty="0"/>
           </a:p>
@@ -6069,138 +6911,167 @@
             <p:ph idx="1"/>
           </p:nvPr>
         </p:nvSpPr>
-        <p:spPr/>
+        <p:spPr>
+          <a:xfrm>
+            <a:off x="457200" y="1508760"/>
+            <a:ext cx="8229600" cy="4815840"/>
+          </a:xfrm>
+        </p:spPr>
         <p:txBody>
-          <a:bodyPr/>
+          <a:bodyPr>
+            <a:normAutofit fontScale="92500" lnSpcReduction="10000"/>
+          </a:bodyPr>
           <a:lstStyle/>
           <a:p>
             <a:r>
               <a:rPr lang="en-US" dirty="0" smtClean="0"/>
-              <a:t>Runs after all cycles have completed</a:t>
-            </a:r>
-          </a:p>
-          <a:p>
-            <a:pPr lvl="1"/>
-            <a:r>
-              <a:rPr lang="en-US" dirty="0" smtClean="0"/>
-              <a:t>In multiprocessing, runs on worker.</a:t>
-            </a:r>
-          </a:p>
-          <a:p>
+              <a:t>Groups: aggregate over image sets</a:t>
+            </a:r>
+          </a:p>
+          <a:p>
+            <a:pPr lvl="1"/>
+            <a:r>
+              <a:rPr lang="en-US" dirty="0" err="1" smtClean="0"/>
+              <a:t>prepare_group</a:t>
+            </a:r>
+            <a:r>
+              <a:rPr lang="en-US" dirty="0" smtClean="0"/>
+              <a:t> – initialize for aggregation</a:t>
+            </a:r>
+          </a:p>
+          <a:p>
+            <a:pPr lvl="1"/>
+            <a:r>
+              <a:rPr lang="en-US" dirty="0" smtClean="0"/>
+              <a:t>Run – accumulate per cycle</a:t>
+            </a:r>
+          </a:p>
+          <a:p>
+            <a:pPr lvl="1"/>
+            <a:r>
+              <a:rPr lang="en-US" dirty="0" smtClean="0"/>
+              <a:t>Finalize the aggregation in run() on the last cycle or in </a:t>
+            </a:r>
             <a:r>
               <a:rPr lang="en-US" dirty="0" err="1" smtClean="0"/>
               <a:t>post_group</a:t>
             </a:r>
-            <a:r>
-              <a:rPr lang="en-US" dirty="0" smtClean="0"/>
-              <a:t> arguments</a:t>
-            </a:r>
-          </a:p>
-          <a:p>
-            <a:pPr lvl="1"/>
-            <a:r>
-              <a:rPr lang="en-US" dirty="0" smtClean="0"/>
-              <a:t>Workspace</a:t>
+            <a:endParaRPr lang="en-US" dirty="0" smtClean="0"/>
+          </a:p>
+          <a:p>
+            <a:pPr lvl="1"/>
+            <a:r>
+              <a:rPr lang="en-US" dirty="0" err="1" smtClean="0"/>
+              <a:t>GroupNumber</a:t>
+            </a:r>
+            <a:r>
+              <a:rPr lang="en-US" dirty="0" smtClean="0"/>
+              <a:t> image meas. same for all cycles in group</a:t>
+            </a:r>
+          </a:p>
+          <a:p>
+            <a:pPr lvl="1"/>
+            <a:r>
+              <a:rPr lang="en-US" dirty="0" err="1" smtClean="0"/>
+              <a:t>GroupIndex</a:t>
+            </a:r>
+            <a:r>
+              <a:rPr lang="en-US" dirty="0" smtClean="0"/>
+              <a:t> image meas. = 1 -&gt; # cycles in group</a:t>
+            </a:r>
+          </a:p>
+          <a:p>
+            <a:pPr lvl="1"/>
+            <a:r>
+              <a:rPr lang="en-US" dirty="0" smtClean="0"/>
+              <a:t>Use the module’s dictionary to store state</a:t>
+            </a:r>
+          </a:p>
+          <a:p>
+            <a:pPr lvl="1"/>
+            <a:r>
+              <a:rPr lang="en-US" dirty="0" smtClean="0"/>
+              <a:t>Groups</a:t>
+            </a:r>
+          </a:p>
+          <a:p>
+            <a:r>
+              <a:rPr lang="en-US" dirty="0" smtClean="0"/>
+              <a:t>Uses of groups</a:t>
+            </a:r>
+          </a:p>
+          <a:p>
+            <a:pPr lvl="1"/>
+            <a:r>
+              <a:rPr lang="en-US" dirty="0" smtClean="0"/>
+              <a:t>Producing an aggregate image (z-</a:t>
+            </a:r>
+            <a:r>
+              <a:rPr lang="en-US" dirty="0" err="1" smtClean="0"/>
+              <a:t>projecction</a:t>
+            </a:r>
+            <a:r>
+              <a:rPr lang="en-US" dirty="0" smtClean="0"/>
+              <a:t>)</a:t>
+            </a:r>
+          </a:p>
+          <a:p>
+            <a:pPr lvl="1"/>
+            <a:r>
+              <a:rPr lang="en-US" dirty="0" smtClean="0"/>
+              <a:t>Treating groups as mini-analyses (e.g. 1 </a:t>
+            </a:r>
+            <a:r>
+              <a:rPr lang="en-US" dirty="0" err="1" smtClean="0"/>
+              <a:t>csv</a:t>
+            </a:r>
+            <a:r>
+              <a:rPr lang="en-US" dirty="0" smtClean="0"/>
+              <a:t> per group)</a:t>
+            </a:r>
+          </a:p>
+          <a:p>
+            <a:pPr lvl="1"/>
+            <a:r>
+              <a:rPr lang="en-US" dirty="0" smtClean="0"/>
+              <a:t>Performing an aggregate analysis at end (e.g. </a:t>
+            </a:r>
+            <a:r>
+              <a:rPr lang="en-US" dirty="0" err="1" smtClean="0"/>
+              <a:t>TrackObjects</a:t>
+            </a:r>
+            <a:r>
+              <a:rPr lang="en-US" dirty="0" smtClean="0"/>
+              <a:t>)</a:t>
             </a:r>
           </a:p>
           <a:p>
             <a:pPr lvl="2"/>
             <a:r>
-              <a:rPr lang="en-US" dirty="0" err="1" smtClean="0"/>
-              <a:t>Image_set</a:t>
-            </a:r>
-            <a:r>
-              <a:rPr lang="en-US" dirty="0" smtClean="0"/>
-              <a:t> / </a:t>
-            </a:r>
-            <a:r>
-              <a:rPr lang="en-US" dirty="0" err="1" smtClean="0"/>
-              <a:t>object_set</a:t>
-            </a:r>
-            <a:r>
-              <a:rPr lang="en-US" dirty="0" smtClean="0"/>
-              <a:t> / measurements all valid</a:t>
+              <a:rPr lang="en-US" dirty="0" smtClean="0"/>
+              <a:t>But think about doing this outside of CellProfiler</a:t>
             </a:r>
             <a:endParaRPr lang="en-US" dirty="0"/>
-          </a:p>
-          <a:p>
-            <a:pPr lvl="1"/>
-            <a:r>
-              <a:rPr lang="en-US" dirty="0" smtClean="0"/>
-              <a:t>Grouping – grouping metadata keys for grouping</a:t>
-            </a:r>
-          </a:p>
-          <a:p>
-            <a:pPr lvl="2"/>
-            <a:r>
-              <a:rPr lang="en-US" dirty="0" smtClean="0"/>
-              <a:t>Legacy – you can get them from </a:t>
-            </a:r>
-            <a:r>
-              <a:rPr lang="en-US" dirty="0" err="1" smtClean="0"/>
-              <a:t>measurements.get_grouping_keys</a:t>
-            </a:r>
-            <a:r>
-              <a:rPr lang="en-US" dirty="0" smtClean="0"/>
-              <a:t>() now</a:t>
-            </a:r>
-          </a:p>
-          <a:p>
-            <a:r>
-              <a:rPr lang="en-US" dirty="0" smtClean="0"/>
-              <a:t>Caveats</a:t>
-            </a:r>
-          </a:p>
-          <a:p>
-            <a:pPr lvl="1"/>
-            <a:r>
-              <a:rPr lang="en-US" dirty="0" smtClean="0"/>
-              <a:t>Runs after </a:t>
-            </a:r>
-            <a:r>
-              <a:rPr lang="en-US" dirty="0" err="1" smtClean="0"/>
-              <a:t>ExportToDatabase</a:t>
-            </a:r>
-            <a:r>
-              <a:rPr lang="en-US" dirty="0" smtClean="0"/>
-              <a:t>, </a:t>
-            </a:r>
-            <a:r>
-              <a:rPr lang="en-US" dirty="0" err="1" smtClean="0"/>
-              <a:t>etc</a:t>
-            </a:r>
-            <a:r>
-              <a:rPr lang="en-US" dirty="0" smtClean="0"/>
-              <a:t> have written measurements</a:t>
-            </a:r>
-          </a:p>
-          <a:p>
-            <a:pPr lvl="1"/>
-            <a:r>
-              <a:rPr lang="en-US" dirty="0" smtClean="0"/>
-              <a:t>Runs before </a:t>
-            </a:r>
-            <a:r>
-              <a:rPr lang="en-US" dirty="0" err="1" smtClean="0"/>
-              <a:t>SaveImages</a:t>
-            </a:r>
-            <a:r>
-              <a:rPr lang="en-US" dirty="0" smtClean="0"/>
-              <a:t> writes per-group images</a:t>
-            </a:r>
           </a:p>
         </p:txBody>
       </p:sp>
     </p:spTree>
     <p:extLst>
       <p:ext uri="{BB962C8B-B14F-4D97-AF65-F5344CB8AC3E}">
-        <p14:creationId xmlns:p14="http://schemas.microsoft.com/office/powerpoint/2010/main" val="3924405280"/>
+        <p14:creationId xmlns:p14="http://schemas.microsoft.com/office/powerpoint/2010/main" val="3447945287"/>
       </p:ext>
     </p:extLst>
   </p:cSld>
   <p:clrMapOvr>
     <a:masterClrMapping/>
   </p:clrMapOvr>
+  <p:timing>
+    <p:tnLst>
+      <p:par>
+        <p:cTn id="1" dur="indefinite" restart="never" nodeType="tmRoot"/>
+      </p:par>
+    </p:tnLst>
+  </p:timing>
 </p:sld>
 </file>
 
@@ -6238,7 +7109,11 @@
           <a:p>
             <a:r>
               <a:rPr lang="en-US" dirty="0" smtClean="0"/>
-              <a:t>②Analysis lifecycle: group exercise6a</a:t>
+              <a:t>②Analysis Lifecycle: </a:t>
+            </a:r>
+            <a:r>
+              <a:rPr lang="en-US" dirty="0" err="1" smtClean="0"/>
+              <a:t>prepare_group</a:t>
             </a:r>
             <a:endParaRPr lang="en-US" dirty="0"/>
           </a:p>
@@ -6254,102 +7129,94 @@
             <p:ph idx="1"/>
           </p:nvPr>
         </p:nvSpPr>
-        <p:spPr>
-          <a:xfrm>
-            <a:off x="457200" y="1570037"/>
-            <a:ext cx="8229600" cy="3763963"/>
-          </a:xfrm>
-        </p:spPr>
+        <p:spPr/>
         <p:txBody>
           <a:bodyPr/>
           <a:lstStyle/>
           <a:p>
             <a:r>
               <a:rPr lang="en-US" dirty="0" smtClean="0"/>
-              <a:t>A median projection module</a:t>
-            </a:r>
-          </a:p>
-          <a:p>
-            <a:r>
-              <a:rPr lang="en-US" dirty="0" smtClean="0"/>
-              <a:t>Copy exercise6.py to exercise6a.py</a:t>
-            </a:r>
-          </a:p>
-          <a:p>
-            <a:pPr lvl="1"/>
-            <a:r>
-              <a:rPr lang="en-US" dirty="0" smtClean="0"/>
-              <a:t>Look at functions e6_state_init, append, median</a:t>
-            </a:r>
-          </a:p>
-          <a:p>
-            <a:r>
-              <a:rPr lang="en-US" dirty="0" smtClean="0"/>
-              <a:t>Call e6_state_init inside </a:t>
-            </a:r>
-            <a:r>
-              <a:rPr lang="en-US" dirty="0" err="1" smtClean="0"/>
-              <a:t>prepare_group</a:t>
-            </a:r>
-            <a:r>
-              <a:rPr lang="en-US" dirty="0" smtClean="0"/>
-              <a:t>()</a:t>
-            </a:r>
-          </a:p>
-          <a:p>
-            <a:pPr lvl="1"/>
-            <a:r>
-              <a:rPr lang="en-US" dirty="0" smtClean="0"/>
-              <a:t>Initializes module dictionary for group</a:t>
-            </a:r>
-          </a:p>
-          <a:p>
-            <a:r>
-              <a:rPr lang="en-US" dirty="0" smtClean="0"/>
-              <a:t>Call e6_state_append inside run()</a:t>
-            </a:r>
-          </a:p>
-          <a:p>
-            <a:pPr lvl="1"/>
-            <a:r>
-              <a:rPr lang="en-US" dirty="0" smtClean="0"/>
-              <a:t>Saves an image plane to the z-stack</a:t>
-            </a:r>
-          </a:p>
-          <a:p>
-            <a:r>
-              <a:rPr lang="en-US" dirty="0" smtClean="0"/>
-              <a:t>Call e6_state_median inside run() on last cycle</a:t>
-            </a:r>
-          </a:p>
-          <a:p>
-            <a:pPr lvl="1"/>
-            <a:r>
-              <a:rPr lang="en-US" dirty="0" smtClean="0"/>
-              <a:t>Calculates the median projection</a:t>
-            </a:r>
-          </a:p>
-          <a:p>
-            <a:r>
-              <a:rPr lang="en-US" dirty="0" smtClean="0"/>
-              <a:t>Save the output image</a:t>
-            </a:r>
-          </a:p>
-          <a:p>
-            <a:r>
-              <a:rPr lang="en-US" dirty="0" smtClean="0"/>
-              <a:t>Test it, try it on SBS data set</a:t>
-            </a:r>
-          </a:p>
-          <a:p>
-            <a:endParaRPr lang="en-US" dirty="0" smtClean="0"/>
-          </a:p>
-          <a:p>
-            <a:pPr lvl="1"/>
-            <a:endParaRPr lang="en-US" dirty="0" smtClean="0"/>
-          </a:p>
-          <a:p>
-            <a:pPr lvl="1"/>
+              <a:t>Prepare group runs before any of the group’s cycles</a:t>
+            </a:r>
+          </a:p>
+          <a:p>
+            <a:pPr lvl="1"/>
+            <a:r>
+              <a:rPr lang="en-US" dirty="0" smtClean="0"/>
+              <a:t>In current code base = always</a:t>
+            </a:r>
+          </a:p>
+          <a:p>
+            <a:pPr lvl="1"/>
+            <a:r>
+              <a:rPr lang="en-US" dirty="0" smtClean="0"/>
+              <a:t>In multiprocessing, if a module is an aggregation module</a:t>
+            </a:r>
+          </a:p>
+          <a:p>
+            <a:pPr lvl="2"/>
+            <a:r>
+              <a:rPr lang="en-US" dirty="0" err="1" smtClean="0"/>
+              <a:t>CPModule.is_aggregation_module</a:t>
+            </a:r>
+            <a:r>
+              <a:rPr lang="en-US" dirty="0" smtClean="0"/>
+              <a:t> returns True </a:t>
+            </a:r>
+          </a:p>
+          <a:p>
+            <a:r>
+              <a:rPr lang="en-US" dirty="0" err="1"/>
+              <a:t>p</a:t>
+            </a:r>
+            <a:r>
+              <a:rPr lang="en-US" dirty="0" err="1" smtClean="0"/>
+              <a:t>repare_group</a:t>
+            </a:r>
+            <a:r>
+              <a:rPr lang="en-US" dirty="0" smtClean="0"/>
+              <a:t> arguments</a:t>
+            </a:r>
+          </a:p>
+          <a:p>
+            <a:pPr lvl="1"/>
+            <a:r>
+              <a:rPr lang="en-US" dirty="0"/>
+              <a:t>w</a:t>
+            </a:r>
+            <a:r>
+              <a:rPr lang="en-US" dirty="0" smtClean="0"/>
+              <a:t>orkspace</a:t>
+            </a:r>
+          </a:p>
+          <a:p>
+            <a:pPr lvl="2"/>
+            <a:r>
+              <a:rPr lang="en-US" dirty="0" smtClean="0"/>
+              <a:t>Only measurements and pipeline are valid</a:t>
+            </a:r>
+          </a:p>
+          <a:p>
+            <a:pPr lvl="1"/>
+            <a:r>
+              <a:rPr lang="en-US" dirty="0"/>
+              <a:t>g</a:t>
+            </a:r>
+            <a:r>
+              <a:rPr lang="en-US" dirty="0" smtClean="0"/>
+              <a:t>rouping – the metadata tags used for grouping (legacy)</a:t>
+            </a:r>
+          </a:p>
+          <a:p>
+            <a:pPr lvl="1"/>
+            <a:r>
+              <a:rPr lang="en-US" dirty="0" err="1" smtClean="0"/>
+              <a:t>image_numbers</a:t>
+            </a:r>
+            <a:r>
+              <a:rPr lang="en-US" dirty="0" smtClean="0"/>
+              <a:t> – the image numbers for the cycles in the group.</a:t>
+            </a:r>
             <a:endParaRPr lang="en-US" dirty="0"/>
           </a:p>
         </p:txBody>
@@ -6357,7 +7224,7 @@
     </p:spTree>
     <p:extLst>
       <p:ext uri="{BB962C8B-B14F-4D97-AF65-F5344CB8AC3E}">
-        <p14:creationId xmlns:p14="http://schemas.microsoft.com/office/powerpoint/2010/main" val="3292918749"/>
+        <p14:creationId xmlns:p14="http://schemas.microsoft.com/office/powerpoint/2010/main" val="870744099"/>
       </p:ext>
     </p:extLst>
   </p:cSld>
@@ -6401,11 +7268,11 @@
           <a:p>
             <a:r>
               <a:rPr lang="en-US" dirty="0" smtClean="0"/>
-              <a:t>②Analysis lifecycle: </a:t>
-            </a:r>
-            <a:r>
-              <a:rPr lang="en-US" dirty="0" err="1" smtClean="0"/>
-              <a:t>prepare_run</a:t>
+              <a:t>②Analysis Lifecycle: </a:t>
+            </a:r>
+            <a:r>
+              <a:rPr lang="en-US" dirty="0" err="1" smtClean="0"/>
+              <a:t>post_group</a:t>
             </a:r>
             <a:endParaRPr lang="en-US" dirty="0"/>
           </a:p>
@@ -6428,116 +7295,125 @@
           <a:p>
             <a:r>
               <a:rPr lang="en-US" dirty="0" smtClean="0"/>
-              <a:t>When is </a:t>
-            </a:r>
-            <a:r>
-              <a:rPr lang="en-US" dirty="0" err="1" smtClean="0"/>
-              <a:t>prepare_run</a:t>
-            </a:r>
-            <a:r>
-              <a:rPr lang="en-US" dirty="0" smtClean="0"/>
-              <a:t> called?</a:t>
-            </a:r>
-          </a:p>
-          <a:p>
-            <a:pPr lvl="1"/>
-            <a:r>
-              <a:rPr lang="en-US" dirty="0" smtClean="0"/>
-              <a:t>Before </a:t>
-            </a:r>
-            <a:r>
-              <a:rPr lang="en-US" dirty="0" err="1" smtClean="0"/>
-              <a:t>CreateBatchFiles</a:t>
-            </a:r>
-            <a:r>
-              <a:rPr lang="en-US" dirty="0" smtClean="0"/>
-              <a:t> / not when running a batch file</a:t>
-            </a:r>
-          </a:p>
-          <a:p>
-            <a:pPr lvl="1"/>
-            <a:r>
-              <a:rPr lang="en-US" dirty="0" smtClean="0"/>
-              <a:t>When going into test mode (unless previously cached)</a:t>
-            </a:r>
-          </a:p>
-          <a:p>
-            <a:pPr lvl="1"/>
-            <a:r>
-              <a:rPr lang="en-US" dirty="0" smtClean="0"/>
-              <a:t>Prior to calling workers for multithreaded</a:t>
-            </a:r>
-          </a:p>
-          <a:p>
-            <a:r>
-              <a:rPr lang="en-US" dirty="0" smtClean="0"/>
-              <a:t>What does it do?</a:t>
-            </a:r>
-          </a:p>
-          <a:p>
-            <a:pPr lvl="1"/>
-            <a:r>
-              <a:rPr lang="en-US" dirty="0" smtClean="0"/>
-              <a:t>Write image &amp; experiment measurements</a:t>
-            </a:r>
-          </a:p>
-          <a:p>
-            <a:pPr lvl="1"/>
-            <a:r>
-              <a:rPr lang="en-US" dirty="0" smtClean="0"/>
-              <a:t>Write </a:t>
-            </a:r>
-            <a:r>
-              <a:rPr lang="en-US" dirty="0" err="1" smtClean="0"/>
-              <a:t>GroupNumber</a:t>
-            </a:r>
-            <a:r>
-              <a:rPr lang="en-US" dirty="0" smtClean="0"/>
-              <a:t> &amp; </a:t>
-            </a:r>
-            <a:r>
-              <a:rPr lang="en-US" dirty="0" err="1" smtClean="0"/>
-              <a:t>GroupIndex</a:t>
-            </a:r>
-            <a:r>
-              <a:rPr lang="en-US" dirty="0" smtClean="0"/>
-              <a:t> to define groups</a:t>
-            </a:r>
-          </a:p>
-          <a:p>
-            <a:r>
-              <a:rPr lang="en-US" dirty="0" smtClean="0"/>
-              <a:t>Uses</a:t>
-            </a:r>
-          </a:p>
-          <a:p>
-            <a:pPr lvl="1"/>
-            <a:r>
-              <a:rPr lang="en-US" dirty="0" smtClean="0"/>
-              <a:t>Create an image set list</a:t>
-            </a:r>
-          </a:p>
-          <a:p>
-            <a:pPr lvl="1"/>
-            <a:r>
-              <a:rPr lang="en-US" dirty="0" smtClean="0"/>
-              <a:t>Initialize a database for an experiment</a:t>
-            </a:r>
-          </a:p>
-          <a:p>
-            <a:pPr lvl="1"/>
-            <a:r>
-              <a:rPr lang="en-US" dirty="0" smtClean="0"/>
-              <a:t>Robotics? Analysis server?</a:t>
+              <a:t>Runs after all cycles have completed</a:t>
+            </a:r>
+          </a:p>
+          <a:p>
+            <a:pPr lvl="1"/>
+            <a:r>
+              <a:rPr lang="en-US" dirty="0" smtClean="0"/>
+              <a:t>In multiprocessing, runs on worker.</a:t>
+            </a:r>
+          </a:p>
+          <a:p>
+            <a:r>
+              <a:rPr lang="en-US" dirty="0" err="1" smtClean="0"/>
+              <a:t>post_group</a:t>
+            </a:r>
+            <a:r>
+              <a:rPr lang="en-US" dirty="0" smtClean="0"/>
+              <a:t> arguments</a:t>
+            </a:r>
+          </a:p>
+          <a:p>
+            <a:pPr lvl="1"/>
+            <a:r>
+              <a:rPr lang="en-US" dirty="0" smtClean="0"/>
+              <a:t>Workspace</a:t>
+            </a:r>
+          </a:p>
+          <a:p>
+            <a:pPr lvl="2"/>
+            <a:r>
+              <a:rPr lang="en-US" dirty="0" err="1" smtClean="0"/>
+              <a:t>Image_set</a:t>
+            </a:r>
+            <a:r>
+              <a:rPr lang="en-US" dirty="0" smtClean="0"/>
+              <a:t> / </a:t>
+            </a:r>
+            <a:r>
+              <a:rPr lang="en-US" dirty="0" err="1" smtClean="0"/>
+              <a:t>object_set</a:t>
+            </a:r>
+            <a:r>
+              <a:rPr lang="en-US" dirty="0" smtClean="0"/>
+              <a:t> / measurements all valid</a:t>
             </a:r>
             <a:endParaRPr lang="en-US" dirty="0"/>
+          </a:p>
+          <a:p>
+            <a:pPr lvl="1"/>
+            <a:r>
+              <a:rPr lang="en-US" dirty="0" smtClean="0"/>
+              <a:t>Grouping – grouping metadata keys for grouping</a:t>
+            </a:r>
+          </a:p>
+          <a:p>
+            <a:pPr lvl="2"/>
+            <a:r>
+              <a:rPr lang="en-US" dirty="0" smtClean="0"/>
+              <a:t>Legacy – you can get them from </a:t>
+            </a:r>
+            <a:r>
+              <a:rPr lang="en-US" dirty="0" err="1" smtClean="0"/>
+              <a:t>measurements.get_grouping_keys</a:t>
+            </a:r>
+            <a:r>
+              <a:rPr lang="en-US" dirty="0" smtClean="0"/>
+              <a:t>() now</a:t>
+            </a:r>
+          </a:p>
+          <a:p>
+            <a:r>
+              <a:rPr lang="en-US" dirty="0" smtClean="0"/>
+              <a:t>Caveats</a:t>
+            </a:r>
+          </a:p>
+          <a:p>
+            <a:pPr lvl="1"/>
+            <a:r>
+              <a:rPr lang="en-US" dirty="0" smtClean="0"/>
+              <a:t>Runs after </a:t>
+            </a:r>
+            <a:r>
+              <a:rPr lang="en-US" dirty="0" err="1" smtClean="0"/>
+              <a:t>ExportToDatabase</a:t>
+            </a:r>
+            <a:r>
+              <a:rPr lang="en-US" dirty="0" smtClean="0"/>
+              <a:t>, </a:t>
+            </a:r>
+            <a:r>
+              <a:rPr lang="en-US" dirty="0" err="1" smtClean="0"/>
+              <a:t>etc</a:t>
+            </a:r>
+            <a:r>
+              <a:rPr lang="en-US" dirty="0" smtClean="0"/>
+              <a:t> have written measurements</a:t>
+            </a:r>
+          </a:p>
+          <a:p>
+            <a:pPr lvl="1"/>
+            <a:r>
+              <a:rPr lang="en-US" dirty="0" smtClean="0"/>
+              <a:t>Runs before </a:t>
+            </a:r>
+            <a:r>
+              <a:rPr lang="en-US" dirty="0" err="1" smtClean="0"/>
+              <a:t>SaveImages</a:t>
+            </a:r>
+            <a:r>
+              <a:rPr lang="en-US" dirty="0" smtClean="0"/>
+              <a:t> writes per-group images</a:t>
+            </a:r>
           </a:p>
         </p:txBody>
       </p:sp>
     </p:spTree>
     <p:extLst>
       <p:ext uri="{BB962C8B-B14F-4D97-AF65-F5344CB8AC3E}">
-        <p14:creationId xmlns:p14="http://schemas.microsoft.com/office/powerpoint/2010/main" val="373281786"/>
+        <p14:creationId xmlns:p14="http://schemas.microsoft.com/office/powerpoint/2010/main" val="3924405280"/>
       </p:ext>
     </p:extLst>
   </p:cSld>
@@ -6581,11 +7457,7 @@
           <a:p>
             <a:r>
               <a:rPr lang="en-US" dirty="0" smtClean="0"/>
-              <a:t>②Analysis lifecycle: </a:t>
-            </a:r>
-            <a:r>
-              <a:rPr lang="en-US" dirty="0" err="1" smtClean="0"/>
-              <a:t>prepare_run</a:t>
+              <a:t>②Analysis lifecycle: group exercise6a</a:t>
             </a:r>
             <a:endParaRPr lang="en-US" dirty="0"/>
           </a:p>
@@ -6601,115 +7473,102 @@
             <p:ph idx="1"/>
           </p:nvPr>
         </p:nvSpPr>
-        <p:spPr/>
+        <p:spPr>
+          <a:xfrm>
+            <a:off x="457200" y="1570037"/>
+            <a:ext cx="8229600" cy="3763963"/>
+          </a:xfrm>
+        </p:spPr>
         <p:txBody>
           <a:bodyPr/>
           <a:lstStyle/>
           <a:p>
             <a:r>
-              <a:rPr lang="en-US" dirty="0" err="1" smtClean="0"/>
-              <a:t>prepare_run’s</a:t>
-            </a:r>
-            <a:r>
-              <a:rPr lang="en-US" dirty="0" smtClean="0"/>
-              <a:t> workspace</a:t>
-            </a:r>
-          </a:p>
-          <a:p>
-            <a:pPr lvl="1"/>
-            <a:r>
-              <a:rPr lang="en-US" dirty="0" smtClean="0"/>
-              <a:t>Pipeline / module are valid</a:t>
-            </a:r>
-          </a:p>
-          <a:p>
-            <a:pPr lvl="1"/>
-            <a:r>
-              <a:rPr lang="en-US" dirty="0" smtClean="0"/>
-              <a:t>Measurements </a:t>
-            </a:r>
-          </a:p>
-          <a:p>
-            <a:pPr lvl="2"/>
-            <a:r>
-              <a:rPr lang="en-US" dirty="0" smtClean="0"/>
-              <a:t>Write per-experiment measurements here</a:t>
-            </a:r>
-          </a:p>
-          <a:p>
-            <a:pPr lvl="2"/>
-            <a:r>
-              <a:rPr lang="en-US" dirty="0" smtClean="0"/>
-              <a:t>Write image measurements for all cycles</a:t>
-            </a:r>
-          </a:p>
-          <a:p>
-            <a:pPr lvl="3"/>
-            <a:r>
-              <a:rPr lang="en-US" dirty="0" err="1" smtClean="0"/>
-              <a:t>FileName</a:t>
-            </a:r>
-            <a:r>
-              <a:rPr lang="en-US" dirty="0" smtClean="0"/>
-              <a:t>_&lt;image-name&gt;</a:t>
-            </a:r>
-          </a:p>
-          <a:p>
-            <a:pPr lvl="3"/>
-            <a:r>
-              <a:rPr lang="en-US" dirty="0" err="1" smtClean="0"/>
-              <a:t>PathName</a:t>
-            </a:r>
-            <a:r>
-              <a:rPr lang="en-US" dirty="0" smtClean="0"/>
-              <a:t>_&lt;image-name&gt;</a:t>
-            </a:r>
-          </a:p>
-          <a:p>
-            <a:pPr lvl="3"/>
-            <a:r>
-              <a:rPr lang="en-US" dirty="0" err="1" smtClean="0"/>
-              <a:t>Url</a:t>
-            </a:r>
-            <a:r>
-              <a:rPr lang="en-US" dirty="0" smtClean="0"/>
-              <a:t>_&lt;image-name&gt;</a:t>
-            </a:r>
-          </a:p>
-          <a:p>
-            <a:pPr lvl="3"/>
-            <a:r>
-              <a:rPr lang="en-US" dirty="0" smtClean="0"/>
-              <a:t>Metadata_&lt;metadata-name&gt;</a:t>
-            </a:r>
-          </a:p>
-          <a:p>
-            <a:r>
-              <a:rPr lang="en-US" dirty="0" smtClean="0"/>
-              <a:t>Return True from </a:t>
-            </a:r>
-            <a:r>
-              <a:rPr lang="en-US" dirty="0" err="1" smtClean="0"/>
-              <a:t>prepare_run</a:t>
-            </a:r>
-            <a:r>
-              <a:rPr lang="en-US" dirty="0" smtClean="0"/>
-              <a:t> if everything is OK</a:t>
-            </a:r>
-          </a:p>
-          <a:p>
-            <a:r>
-              <a:rPr lang="en-US" dirty="0" smtClean="0"/>
-              <a:t>Implement “</a:t>
-            </a:r>
-            <a:r>
-              <a:rPr lang="en-US" dirty="0" err="1" smtClean="0"/>
-              <a:t>is_load_module</a:t>
-            </a:r>
-            <a:r>
-              <a:rPr lang="en-US" dirty="0" smtClean="0"/>
-              <a:t>” if your module loads images</a:t>
-            </a:r>
+              <a:rPr lang="en-US" dirty="0" smtClean="0"/>
+              <a:t>A median projection module</a:t>
+            </a:r>
+          </a:p>
+          <a:p>
+            <a:r>
+              <a:rPr lang="en-US" dirty="0" smtClean="0"/>
+              <a:t>Copy exercise6.py to exercise6a.py</a:t>
+            </a:r>
+          </a:p>
+          <a:p>
+            <a:pPr lvl="1"/>
+            <a:r>
+              <a:rPr lang="en-US" dirty="0" smtClean="0"/>
+              <a:t>Look at functions e6_state_init, append, median</a:t>
+            </a:r>
+          </a:p>
+          <a:p>
+            <a:r>
+              <a:rPr lang="en-US" dirty="0" smtClean="0"/>
+              <a:t>Call e6_state_init inside </a:t>
+            </a:r>
+            <a:r>
+              <a:rPr lang="en-US" dirty="0" err="1" smtClean="0"/>
+              <a:t>prepare_group</a:t>
+            </a:r>
+            <a:r>
+              <a:rPr lang="en-US" dirty="0" smtClean="0"/>
+              <a:t>()</a:t>
+            </a:r>
+          </a:p>
+          <a:p>
+            <a:pPr lvl="1"/>
+            <a:r>
+              <a:rPr lang="en-US" dirty="0" smtClean="0"/>
+              <a:t>Initializes module dictionary for group</a:t>
+            </a:r>
+          </a:p>
+          <a:p>
+            <a:r>
+              <a:rPr lang="en-US" dirty="0" smtClean="0"/>
+              <a:t>Call e6_state_append inside run()</a:t>
+            </a:r>
+          </a:p>
+          <a:p>
+            <a:pPr lvl="1"/>
+            <a:r>
+              <a:rPr lang="en-US" dirty="0" smtClean="0"/>
+              <a:t>Saves an image plane to the z-stack</a:t>
+            </a:r>
+          </a:p>
+          <a:p>
+            <a:r>
+              <a:rPr lang="en-US" dirty="0" smtClean="0"/>
+              <a:t>Call e6_state_median inside run() on last cycle</a:t>
+            </a:r>
+          </a:p>
+          <a:p>
+            <a:pPr lvl="1"/>
+            <a:r>
+              <a:rPr lang="en-US" dirty="0" smtClean="0"/>
+              <a:t>Calculates the median projection</a:t>
+            </a:r>
+          </a:p>
+          <a:p>
+            <a:r>
+              <a:rPr lang="en-US" dirty="0" smtClean="0"/>
+              <a:t>Save the output image</a:t>
+            </a:r>
+          </a:p>
+          <a:p>
+            <a:r>
+              <a:rPr lang="en-US" dirty="0" smtClean="0"/>
+              <a:t>Test it, try it on SBS data set</a:t>
+            </a:r>
+          </a:p>
+          <a:p>
+            <a:endParaRPr lang="en-US" dirty="0" smtClean="0"/>
+          </a:p>
+          <a:p>
+            <a:pPr lvl="1"/>
+            <a:endParaRPr lang="en-US" dirty="0" smtClean="0"/>
+          </a:p>
+          <a:p>
+            <a:pPr lvl="1"/>
             <a:endParaRPr lang="en-US" dirty="0"/>
           </a:p>
         </p:txBody>
@@ -6717,7 +7576,7 @@
     </p:spTree>
     <p:extLst>
       <p:ext uri="{BB962C8B-B14F-4D97-AF65-F5344CB8AC3E}">
-        <p14:creationId xmlns:p14="http://schemas.microsoft.com/office/powerpoint/2010/main" val="2118862606"/>
+        <p14:creationId xmlns:p14="http://schemas.microsoft.com/office/powerpoint/2010/main" val="3292918749"/>
       </p:ext>
     </p:extLst>
   </p:cSld>
@@ -6767,10 +7626,6 @@
               <a:rPr lang="en-US" dirty="0" err="1" smtClean="0"/>
               <a:t>prepare_run</a:t>
             </a:r>
-            <a:r>
-              <a:rPr lang="en-US" dirty="0" smtClean="0"/>
-              <a:t> exercise</a:t>
-            </a:r>
             <a:endParaRPr lang="en-US" dirty="0"/>
           </a:p>
         </p:txBody>
@@ -6785,143 +7640,123 @@
             <p:ph idx="1"/>
           </p:nvPr>
         </p:nvSpPr>
-        <p:spPr>
-          <a:xfrm>
-            <a:off x="457200" y="1508760"/>
-            <a:ext cx="8229600" cy="4663440"/>
-          </a:xfrm>
-        </p:spPr>
+        <p:spPr/>
         <p:txBody>
-          <a:bodyPr>
-            <a:normAutofit fontScale="92500"/>
-          </a:bodyPr>
+          <a:bodyPr/>
           <a:lstStyle/>
           <a:p>
             <a:r>
               <a:rPr lang="en-US" dirty="0" smtClean="0"/>
-              <a:t>A module that makes image sets using today’s .</a:t>
-            </a:r>
-            <a:r>
-              <a:rPr lang="en-US" dirty="0" err="1" smtClean="0"/>
-              <a:t>tif</a:t>
-            </a:r>
-            <a:r>
-              <a:rPr lang="en-US" dirty="0" smtClean="0"/>
-              <a:t> files</a:t>
-            </a:r>
-          </a:p>
-          <a:p>
-            <a:r>
-              <a:rPr lang="en-US" dirty="0" smtClean="0"/>
-              <a:t>Edit example6b.py</a:t>
-            </a:r>
-          </a:p>
-          <a:p>
-            <a:pPr lvl="1"/>
-            <a:r>
-              <a:rPr lang="en-US" dirty="0" smtClean="0"/>
-              <a:t>In </a:t>
+              <a:t>When is </a:t>
             </a:r>
             <a:r>
               <a:rPr lang="en-US" dirty="0" err="1" smtClean="0"/>
               <a:t>prepare_run</a:t>
             </a:r>
-            <a:endParaRPr lang="en-US" dirty="0" smtClean="0"/>
-          </a:p>
-          <a:p>
-            <a:pPr lvl="2"/>
-            <a:r>
-              <a:rPr lang="en-US" dirty="0" smtClean="0"/>
-              <a:t>add an experiment measurement called “Example6b_FirstTime” to record the earliest acceptable file creation time</a:t>
-            </a:r>
-          </a:p>
-          <a:p>
-            <a:pPr lvl="2"/>
-            <a:r>
-              <a:rPr lang="en-US" dirty="0" smtClean="0"/>
-              <a:t>Add </a:t>
-            </a:r>
-            <a:r>
-              <a:rPr lang="en-US" dirty="0" err="1" smtClean="0"/>
-              <a:t>FileName</a:t>
-            </a:r>
-            <a:r>
-              <a:rPr lang="en-US" dirty="0" smtClean="0"/>
-              <a:t> and </a:t>
-            </a:r>
-            <a:r>
-              <a:rPr lang="en-US" dirty="0" err="1" smtClean="0"/>
-              <a:t>PathName</a:t>
-            </a:r>
-            <a:r>
-              <a:rPr lang="en-US" dirty="0" smtClean="0"/>
-              <a:t> measurements for each file</a:t>
-            </a:r>
-          </a:p>
-          <a:p>
-            <a:pPr lvl="1"/>
-            <a:r>
-              <a:rPr lang="en-US" dirty="0" smtClean="0"/>
-              <a:t>In run</a:t>
-            </a:r>
-          </a:p>
-          <a:p>
-            <a:pPr lvl="2"/>
-            <a:r>
-              <a:rPr lang="en-US" dirty="0" smtClean="0"/>
-              <a:t>Read the cycle’s </a:t>
-            </a:r>
-            <a:r>
-              <a:rPr lang="en-US" dirty="0" err="1" smtClean="0"/>
-              <a:t>FileName</a:t>
-            </a:r>
-            <a:r>
-              <a:rPr lang="en-US" dirty="0" smtClean="0"/>
-              <a:t> and </a:t>
-            </a:r>
-            <a:r>
-              <a:rPr lang="en-US" dirty="0" err="1" smtClean="0"/>
-              <a:t>PathName</a:t>
-            </a:r>
-            <a:r>
-              <a:rPr lang="en-US" dirty="0" smtClean="0"/>
-              <a:t> measurements</a:t>
-            </a:r>
-          </a:p>
-          <a:p>
-            <a:pPr lvl="2"/>
-            <a:r>
-              <a:rPr lang="en-US" dirty="0" smtClean="0"/>
-              <a:t>Call </a:t>
-            </a:r>
-            <a:r>
-              <a:rPr lang="en-US" dirty="0" err="1" smtClean="0"/>
-              <a:t>load_using_bioformats</a:t>
-            </a:r>
-            <a:r>
-              <a:rPr lang="en-US" dirty="0" smtClean="0"/>
-              <a:t> to read the image</a:t>
-            </a:r>
-          </a:p>
-          <a:p>
-            <a:pPr lvl="2"/>
-            <a:r>
-              <a:rPr lang="en-US" dirty="0" smtClean="0"/>
-              <a:t>Add the image to the image set</a:t>
-            </a:r>
-          </a:p>
-          <a:p>
-            <a:r>
-              <a:rPr lang="en-US" dirty="0" smtClean="0"/>
-              <a:t>Test it, try it</a:t>
-            </a:r>
+            <a:r>
+              <a:rPr lang="en-US" dirty="0" smtClean="0"/>
+              <a:t> called?</a:t>
+            </a:r>
+          </a:p>
+          <a:p>
+            <a:pPr lvl="1"/>
+            <a:r>
+              <a:rPr lang="en-US" dirty="0" smtClean="0"/>
+              <a:t>Before </a:t>
+            </a:r>
+            <a:r>
+              <a:rPr lang="en-US" dirty="0" err="1" smtClean="0"/>
+              <a:t>CreateBatchFiles</a:t>
+            </a:r>
+            <a:r>
+              <a:rPr lang="en-US" dirty="0" smtClean="0"/>
+              <a:t> / not when running a batch file</a:t>
+            </a:r>
+          </a:p>
+          <a:p>
+            <a:pPr lvl="1"/>
+            <a:r>
+              <a:rPr lang="en-US" dirty="0" smtClean="0"/>
+              <a:t>When going into test mode (unless previously cached)</a:t>
+            </a:r>
+          </a:p>
+          <a:p>
+            <a:pPr lvl="1"/>
+            <a:r>
+              <a:rPr lang="en-US" dirty="0" smtClean="0"/>
+              <a:t>Prior to calling workers for multithreaded</a:t>
+            </a:r>
+          </a:p>
+          <a:p>
+            <a:r>
+              <a:rPr lang="en-US" dirty="0" smtClean="0"/>
+              <a:t>What does it do?</a:t>
+            </a:r>
+          </a:p>
+          <a:p>
+            <a:pPr lvl="1"/>
+            <a:r>
+              <a:rPr lang="en-US" dirty="0" smtClean="0"/>
+              <a:t>Write image &amp; experiment measurements</a:t>
+            </a:r>
+          </a:p>
+          <a:p>
+            <a:pPr lvl="1"/>
+            <a:r>
+              <a:rPr lang="en-US" dirty="0" smtClean="0"/>
+              <a:t>Write </a:t>
+            </a:r>
+            <a:r>
+              <a:rPr lang="en-US" dirty="0" err="1" smtClean="0"/>
+              <a:t>GroupNumber</a:t>
+            </a:r>
+            <a:r>
+              <a:rPr lang="en-US" dirty="0" smtClean="0"/>
+              <a:t> &amp; </a:t>
+            </a:r>
+            <a:r>
+              <a:rPr lang="en-US" dirty="0" err="1" smtClean="0"/>
+              <a:t>GroupIndex</a:t>
+            </a:r>
+            <a:r>
+              <a:rPr lang="en-US" dirty="0" smtClean="0"/>
+              <a:t> to define groups</a:t>
+            </a:r>
+          </a:p>
+          <a:p>
+            <a:r>
+              <a:rPr lang="en-US" dirty="0" smtClean="0"/>
+              <a:t>Uses</a:t>
+            </a:r>
+          </a:p>
+          <a:p>
+            <a:pPr lvl="1"/>
+            <a:r>
+              <a:rPr lang="en-US" dirty="0" smtClean="0"/>
+              <a:t>Create an image set list</a:t>
+            </a:r>
+          </a:p>
+          <a:p>
+            <a:pPr lvl="1"/>
+            <a:r>
+              <a:rPr lang="en-US" dirty="0" smtClean="0"/>
+              <a:t>Initialize a database for an experiment</a:t>
+            </a:r>
+          </a:p>
+          <a:p>
+            <a:pPr lvl="1"/>
+            <a:r>
+              <a:rPr lang="en-US" dirty="0" smtClean="0"/>
+              <a:t>Robotics? Analysis server?</a:t>
+            </a:r>
+            <a:endParaRPr lang="en-US" dirty="0"/>
           </a:p>
         </p:txBody>
       </p:sp>
     </p:spTree>
     <p:extLst>
       <p:ext uri="{BB962C8B-B14F-4D97-AF65-F5344CB8AC3E}">
-        <p14:creationId xmlns:p14="http://schemas.microsoft.com/office/powerpoint/2010/main" val="2381593082"/>
+        <p14:creationId xmlns:p14="http://schemas.microsoft.com/office/powerpoint/2010/main" val="373281786"/>
       </p:ext>
     </p:extLst>
   </p:cSld>
@@ -6965,11 +7800,11 @@
           <a:p>
             <a:r>
               <a:rPr lang="en-US" dirty="0" smtClean="0"/>
-              <a:t>③Analysis lifecycle: </a:t>
-            </a:r>
-            <a:r>
-              <a:rPr lang="en-US" dirty="0" err="1" smtClean="0"/>
-              <a:t>CreateBatchFile</a:t>
+              <a:t>②Analysis lifecycle: </a:t>
+            </a:r>
+            <a:r>
+              <a:rPr lang="en-US" dirty="0" err="1" smtClean="0"/>
+              <a:t>prepare_run</a:t>
             </a:r>
             <a:endParaRPr lang="en-US" dirty="0"/>
           </a:p>
@@ -6991,15 +7826,86 @@
           <a:lstStyle/>
           <a:p>
             <a:r>
-              <a:rPr lang="en-US" dirty="0" smtClean="0"/>
-              <a:t>Making a load module batch-friendly</a:t>
-            </a:r>
-          </a:p>
-          <a:p>
-            <a:pPr lvl="1"/>
-            <a:r>
-              <a:rPr lang="en-US" dirty="0" smtClean="0"/>
-              <a:t>In </a:t>
+              <a:rPr lang="en-US" dirty="0" err="1" smtClean="0"/>
+              <a:t>prepare_run’s</a:t>
+            </a:r>
+            <a:r>
+              <a:rPr lang="en-US" dirty="0" smtClean="0"/>
+              <a:t> workspace</a:t>
+            </a:r>
+          </a:p>
+          <a:p>
+            <a:pPr lvl="1"/>
+            <a:r>
+              <a:rPr lang="en-US" dirty="0" smtClean="0"/>
+              <a:t>Pipeline / module are valid</a:t>
+            </a:r>
+          </a:p>
+          <a:p>
+            <a:pPr lvl="1"/>
+            <a:r>
+              <a:rPr lang="en-US" dirty="0" smtClean="0"/>
+              <a:t>Measurements </a:t>
+            </a:r>
+          </a:p>
+          <a:p>
+            <a:pPr lvl="2"/>
+            <a:r>
+              <a:rPr lang="en-US" dirty="0" smtClean="0"/>
+              <a:t>Write per-experiment measurements here</a:t>
+            </a:r>
+          </a:p>
+          <a:p>
+            <a:pPr lvl="2"/>
+            <a:r>
+              <a:rPr lang="en-US" dirty="0" smtClean="0"/>
+              <a:t>Write image measurements for all cycles</a:t>
+            </a:r>
+          </a:p>
+          <a:p>
+            <a:pPr lvl="3"/>
+            <a:r>
+              <a:rPr lang="en-US" dirty="0" err="1" smtClean="0"/>
+              <a:t>FileName</a:t>
+            </a:r>
+            <a:r>
+              <a:rPr lang="en-US" dirty="0" smtClean="0"/>
+              <a:t>_&lt;image-name&gt;</a:t>
+            </a:r>
+          </a:p>
+          <a:p>
+            <a:pPr lvl="3"/>
+            <a:r>
+              <a:rPr lang="en-US" dirty="0" err="1" smtClean="0"/>
+              <a:t>PathName</a:t>
+            </a:r>
+            <a:r>
+              <a:rPr lang="en-US" dirty="0" smtClean="0"/>
+              <a:t>_&lt;image-name&gt;</a:t>
+            </a:r>
+          </a:p>
+          <a:p>
+            <a:pPr lvl="3"/>
+            <a:r>
+              <a:rPr lang="en-US" dirty="0" err="1" smtClean="0"/>
+              <a:t>Url</a:t>
+            </a:r>
+            <a:r>
+              <a:rPr lang="en-US" dirty="0" smtClean="0"/>
+              <a:t>_&lt;image-name&gt;</a:t>
+            </a:r>
+          </a:p>
+          <a:p>
+            <a:pPr lvl="3"/>
+            <a:r>
+              <a:rPr lang="en-US" dirty="0" smtClean="0"/>
+              <a:t>Metadata_&lt;metadata-name&gt;</a:t>
+            </a:r>
+          </a:p>
+          <a:p>
+            <a:r>
+              <a:rPr lang="en-US" dirty="0" smtClean="0"/>
+              <a:t>Return True from </a:t>
             </a:r>
             <a:r>
               <a:rPr lang="en-US" dirty="0" err="1" smtClean="0"/>
@@ -7007,106 +7913,21 @@
             </a:r>
             <a:r>
               <a:rPr lang="en-US" dirty="0" smtClean="0"/>
-              <a:t>, don’t </a:t>
-            </a:r>
-            <a:r>
-              <a:rPr lang="en-US" dirty="0"/>
-              <a:t>do anything </a:t>
-            </a:r>
-            <a:r>
-              <a:rPr lang="en-US" dirty="0" smtClean="0"/>
-              <a:t>if </a:t>
-            </a:r>
-            <a:r>
-              <a:rPr lang="en-US" dirty="0" err="1" smtClean="0"/>
-              <a:t>workspace.pipeline.in_batch_mode</a:t>
-            </a:r>
-            <a:r>
-              <a:rPr lang="en-US" dirty="0" smtClean="0"/>
-              <a:t>()</a:t>
-            </a:r>
-          </a:p>
-          <a:p>
-            <a:pPr lvl="1"/>
-            <a:r>
-              <a:rPr lang="en-US" dirty="0" smtClean="0"/>
-              <a:t>Implement </a:t>
-            </a:r>
-            <a:r>
-              <a:rPr lang="en-US" dirty="0" err="1" smtClean="0"/>
-              <a:t>prepare_to_create_batch</a:t>
-            </a:r>
-            <a:endParaRPr lang="en-US" dirty="0" smtClean="0"/>
-          </a:p>
-          <a:p>
-            <a:pPr lvl="2"/>
-            <a:r>
-              <a:rPr lang="en-US" dirty="0" smtClean="0"/>
-              <a:t>Purpose: </a:t>
-            </a:r>
-          </a:p>
-          <a:p>
-            <a:pPr lvl="3"/>
-            <a:r>
-              <a:rPr lang="en-US" dirty="0" smtClean="0"/>
-              <a:t>windows -&gt; Linux paths</a:t>
-            </a:r>
-          </a:p>
-          <a:p>
-            <a:pPr lvl="3"/>
-            <a:r>
-              <a:rPr lang="en-US" dirty="0" smtClean="0"/>
-              <a:t>Client </a:t>
-            </a:r>
-            <a:r>
-              <a:rPr lang="en-US" dirty="0" err="1" smtClean="0"/>
-              <a:t>filesystem</a:t>
-            </a:r>
-            <a:r>
-              <a:rPr lang="en-US" dirty="0" smtClean="0"/>
-              <a:t> -&gt; cluster </a:t>
-            </a:r>
-            <a:r>
-              <a:rPr lang="en-US" dirty="0" err="1" smtClean="0"/>
-              <a:t>filesystem</a:t>
-            </a:r>
-            <a:endParaRPr lang="en-US" dirty="0" smtClean="0"/>
-          </a:p>
-          <a:p>
-            <a:pPr lvl="2"/>
-            <a:r>
-              <a:rPr lang="en-US" dirty="0" smtClean="0"/>
-              <a:t>Call </a:t>
-            </a:r>
-            <a:r>
-              <a:rPr lang="en-US" dirty="0" err="1" smtClean="0"/>
-              <a:t>measurements.alter_path_for_create_batch</a:t>
-            </a:r>
-            <a:r>
-              <a:rPr lang="en-US" dirty="0" smtClean="0"/>
-              <a:t> with each of your image names</a:t>
-            </a:r>
-          </a:p>
-          <a:p>
-            <a:pPr lvl="2"/>
-            <a:r>
-              <a:rPr lang="en-US" dirty="0" smtClean="0"/>
-              <a:t>Call </a:t>
-            </a:r>
-            <a:r>
-              <a:rPr lang="en-US" dirty="0" err="1" smtClean="0"/>
-              <a:t>DirectoryPath.alter_for_create_batch_files</a:t>
-            </a:r>
-            <a:endParaRPr lang="en-US" dirty="0" smtClean="0"/>
-          </a:p>
-          <a:p>
-            <a:r>
-              <a:rPr lang="en-US" dirty="0" smtClean="0"/>
-              <a:t>Exercise 6c. Make </a:t>
-            </a:r>
-            <a:r>
-              <a:rPr lang="en-US" smtClean="0"/>
-              <a:t>Exercise6b.py batch-friendly</a:t>
+              <a:t> if everything is OK</a:t>
+            </a:r>
+          </a:p>
+          <a:p>
+            <a:r>
+              <a:rPr lang="en-US" dirty="0" smtClean="0"/>
+              <a:t>Implement “</a:t>
+            </a:r>
+            <a:r>
+              <a:rPr lang="en-US" dirty="0" err="1" smtClean="0"/>
+              <a:t>is_load_module</a:t>
+            </a:r>
+            <a:r>
+              <a:rPr lang="en-US" dirty="0" smtClean="0"/>
+              <a:t>” if your module loads images</a:t>
             </a:r>
             <a:endParaRPr lang="en-US" dirty="0"/>
           </a:p>
@@ -7115,7 +7936,211 @@
     </p:spTree>
     <p:extLst>
       <p:ext uri="{BB962C8B-B14F-4D97-AF65-F5344CB8AC3E}">
-        <p14:creationId xmlns:p14="http://schemas.microsoft.com/office/powerpoint/2010/main" val="2646266753"/>
+        <p14:creationId xmlns:p14="http://schemas.microsoft.com/office/powerpoint/2010/main" val="2118862606"/>
+      </p:ext>
+    </p:extLst>
+  </p:cSld>
+  <p:clrMapOvr>
+    <a:masterClrMapping/>
+  </p:clrMapOvr>
+</p:sld>
+</file>
+
+<file path=ppt/slides/slide39.xml><?xml version="1.0" encoding="utf-8"?>
+<p:sld xmlns:a="http://schemas.openxmlformats.org/drawingml/2006/main" xmlns:r="http://schemas.openxmlformats.org/officeDocument/2006/relationships" xmlns:p="http://schemas.openxmlformats.org/presentationml/2006/main">
+  <p:cSld>
+    <p:spTree>
+      <p:nvGrpSpPr>
+        <p:cNvPr id="1" name=""/>
+        <p:cNvGrpSpPr/>
+        <p:nvPr/>
+      </p:nvGrpSpPr>
+      <p:grpSpPr>
+        <a:xfrm>
+          <a:off x="0" y="0"/>
+          <a:ext cx="0" cy="0"/>
+          <a:chOff x="0" y="0"/>
+          <a:chExt cx="0" cy="0"/>
+        </a:xfrm>
+      </p:grpSpPr>
+      <p:sp>
+        <p:nvSpPr>
+          <p:cNvPr id="2" name="Title 1"/>
+          <p:cNvSpPr>
+            <a:spLocks noGrp="1"/>
+          </p:cNvSpPr>
+          <p:nvPr>
+            <p:ph type="title"/>
+          </p:nvPr>
+        </p:nvSpPr>
+        <p:spPr/>
+        <p:txBody>
+          <a:bodyPr/>
+          <a:lstStyle/>
+          <a:p>
+            <a:r>
+              <a:rPr lang="en-US" dirty="0" smtClean="0"/>
+              <a:t>②Analysis lifecycle: </a:t>
+            </a:r>
+            <a:r>
+              <a:rPr lang="en-US" dirty="0" err="1" smtClean="0"/>
+              <a:t>prepare_run</a:t>
+            </a:r>
+            <a:r>
+              <a:rPr lang="en-US" dirty="0" smtClean="0"/>
+              <a:t> exercise</a:t>
+            </a:r>
+            <a:endParaRPr lang="en-US" dirty="0"/>
+          </a:p>
+        </p:txBody>
+      </p:sp>
+      <p:sp>
+        <p:nvSpPr>
+          <p:cNvPr id="3" name="Content Placeholder 2"/>
+          <p:cNvSpPr>
+            <a:spLocks noGrp="1"/>
+          </p:cNvSpPr>
+          <p:nvPr>
+            <p:ph idx="1"/>
+          </p:nvPr>
+        </p:nvSpPr>
+        <p:spPr>
+          <a:xfrm>
+            <a:off x="457200" y="1508760"/>
+            <a:ext cx="8229600" cy="4663440"/>
+          </a:xfrm>
+        </p:spPr>
+        <p:txBody>
+          <a:bodyPr>
+            <a:normAutofit fontScale="92500"/>
+          </a:bodyPr>
+          <a:lstStyle/>
+          <a:p>
+            <a:r>
+              <a:rPr lang="en-US" dirty="0" smtClean="0"/>
+              <a:t>A module that makes image sets using today’s .</a:t>
+            </a:r>
+            <a:r>
+              <a:rPr lang="en-US" dirty="0" err="1" smtClean="0"/>
+              <a:t>tif</a:t>
+            </a:r>
+            <a:r>
+              <a:rPr lang="en-US" dirty="0" smtClean="0"/>
+              <a:t> files</a:t>
+            </a:r>
+          </a:p>
+          <a:p>
+            <a:r>
+              <a:rPr lang="en-US" dirty="0" smtClean="0"/>
+              <a:t>Edit example6b.py</a:t>
+            </a:r>
+          </a:p>
+          <a:p>
+            <a:pPr lvl="1"/>
+            <a:r>
+              <a:rPr lang="en-US" dirty="0" smtClean="0"/>
+              <a:t>In </a:t>
+            </a:r>
+            <a:r>
+              <a:rPr lang="en-US" dirty="0" err="1" smtClean="0"/>
+              <a:t>prepare_run</a:t>
+            </a:r>
+            <a:endParaRPr lang="en-US" dirty="0" smtClean="0"/>
+          </a:p>
+          <a:p>
+            <a:pPr lvl="2"/>
+            <a:r>
+              <a:rPr lang="en-US" dirty="0" smtClean="0"/>
+              <a:t>add an experiment measurement called “Example6b_FirstTime” to record the earliest acceptable file creation time</a:t>
+            </a:r>
+          </a:p>
+          <a:p>
+            <a:pPr lvl="2"/>
+            <a:r>
+              <a:rPr lang="en-US" dirty="0" smtClean="0"/>
+              <a:t>Add </a:t>
+            </a:r>
+            <a:r>
+              <a:rPr lang="en-US" dirty="0" err="1" smtClean="0"/>
+              <a:t>FileName</a:t>
+            </a:r>
+            <a:r>
+              <a:rPr lang="en-US" dirty="0" smtClean="0"/>
+              <a:t> and </a:t>
+            </a:r>
+            <a:r>
+              <a:rPr lang="en-US" dirty="0" err="1" smtClean="0"/>
+              <a:t>PathName</a:t>
+            </a:r>
+            <a:r>
+              <a:rPr lang="en-US" dirty="0" smtClean="0"/>
+              <a:t> measurements for each file</a:t>
+            </a:r>
+          </a:p>
+          <a:p>
+            <a:pPr lvl="1"/>
+            <a:r>
+              <a:rPr lang="en-US" dirty="0" smtClean="0"/>
+              <a:t>In run</a:t>
+            </a:r>
+          </a:p>
+          <a:p>
+            <a:pPr lvl="2"/>
+            <a:r>
+              <a:rPr lang="en-US" dirty="0" smtClean="0"/>
+              <a:t>Read the cycle’s </a:t>
+            </a:r>
+            <a:r>
+              <a:rPr lang="en-US" dirty="0" err="1" smtClean="0"/>
+              <a:t>FileName</a:t>
+            </a:r>
+            <a:r>
+              <a:rPr lang="en-US" dirty="0" smtClean="0"/>
+              <a:t> and </a:t>
+            </a:r>
+            <a:r>
+              <a:rPr lang="en-US" dirty="0" err="1" smtClean="0"/>
+              <a:t>PathName</a:t>
+            </a:r>
+            <a:r>
+              <a:rPr lang="en-US" dirty="0" smtClean="0"/>
+              <a:t> measurements</a:t>
+            </a:r>
+          </a:p>
+          <a:p>
+            <a:pPr lvl="2"/>
+            <a:r>
+              <a:rPr lang="en-US" dirty="0" smtClean="0"/>
+              <a:t>Call </a:t>
+            </a:r>
+            <a:r>
+              <a:rPr lang="en-US" dirty="0" err="1" smtClean="0"/>
+              <a:t>load_using_bioformats</a:t>
+            </a:r>
+            <a:r>
+              <a:rPr lang="en-US" dirty="0" smtClean="0"/>
+              <a:t> to read the image</a:t>
+            </a:r>
+          </a:p>
+          <a:p>
+            <a:pPr lvl="2"/>
+            <a:r>
+              <a:rPr lang="en-US" dirty="0" smtClean="0"/>
+              <a:t>Add the image to the image set</a:t>
+            </a:r>
+          </a:p>
+          <a:p>
+            <a:r>
+              <a:rPr lang="en-US" dirty="0" smtClean="0"/>
+              <a:t>Test it, try it</a:t>
+            </a:r>
+          </a:p>
+        </p:txBody>
+      </p:sp>
+    </p:spTree>
+    <p:extLst>
+      <p:ext uri="{BB962C8B-B14F-4D97-AF65-F5344CB8AC3E}">
+        <p14:creationId xmlns:p14="http://schemas.microsoft.com/office/powerpoint/2010/main" val="2381593082"/>
       </p:ext>
     </p:extLst>
   </p:cSld>
@@ -7416,6 +8441,200 @@
     <p:extLst>
       <p:ext uri="{BB962C8B-B14F-4D97-AF65-F5344CB8AC3E}">
         <p14:creationId xmlns:p14="http://schemas.microsoft.com/office/powerpoint/2010/main" val="4161967969"/>
+      </p:ext>
+    </p:extLst>
+  </p:cSld>
+  <p:clrMapOvr>
+    <a:masterClrMapping/>
+  </p:clrMapOvr>
+</p:sld>
+</file>
+
+<file path=ppt/slides/slide40.xml><?xml version="1.0" encoding="utf-8"?>
+<p:sld xmlns:a="http://schemas.openxmlformats.org/drawingml/2006/main" xmlns:r="http://schemas.openxmlformats.org/officeDocument/2006/relationships" xmlns:p="http://schemas.openxmlformats.org/presentationml/2006/main">
+  <p:cSld>
+    <p:spTree>
+      <p:nvGrpSpPr>
+        <p:cNvPr id="1" name=""/>
+        <p:cNvGrpSpPr/>
+        <p:nvPr/>
+      </p:nvGrpSpPr>
+      <p:grpSpPr>
+        <a:xfrm>
+          <a:off x="0" y="0"/>
+          <a:ext cx="0" cy="0"/>
+          <a:chOff x="0" y="0"/>
+          <a:chExt cx="0" cy="0"/>
+        </a:xfrm>
+      </p:grpSpPr>
+      <p:sp>
+        <p:nvSpPr>
+          <p:cNvPr id="2" name="Title 1"/>
+          <p:cNvSpPr>
+            <a:spLocks noGrp="1"/>
+          </p:cNvSpPr>
+          <p:nvPr>
+            <p:ph type="title"/>
+          </p:nvPr>
+        </p:nvSpPr>
+        <p:spPr/>
+        <p:txBody>
+          <a:bodyPr/>
+          <a:lstStyle/>
+          <a:p>
+            <a:r>
+              <a:rPr lang="en-US" dirty="0" smtClean="0"/>
+              <a:t>③Analysis lifecycle: </a:t>
+            </a:r>
+            <a:r>
+              <a:rPr lang="en-US" dirty="0" err="1" smtClean="0"/>
+              <a:t>CreateBatchFile</a:t>
+            </a:r>
+            <a:endParaRPr lang="en-US" dirty="0"/>
+          </a:p>
+        </p:txBody>
+      </p:sp>
+      <p:sp>
+        <p:nvSpPr>
+          <p:cNvPr id="3" name="Content Placeholder 2"/>
+          <p:cNvSpPr>
+            <a:spLocks noGrp="1"/>
+          </p:cNvSpPr>
+          <p:nvPr>
+            <p:ph idx="1"/>
+          </p:nvPr>
+        </p:nvSpPr>
+        <p:spPr/>
+        <p:txBody>
+          <a:bodyPr/>
+          <a:lstStyle/>
+          <a:p>
+            <a:r>
+              <a:rPr lang="en-US" dirty="0" smtClean="0"/>
+              <a:t>Making a load module batch-friendly</a:t>
+            </a:r>
+          </a:p>
+          <a:p>
+            <a:pPr lvl="1"/>
+            <a:r>
+              <a:rPr lang="en-US" dirty="0" smtClean="0"/>
+              <a:t>In </a:t>
+            </a:r>
+            <a:r>
+              <a:rPr lang="en-US" dirty="0" err="1" smtClean="0"/>
+              <a:t>prepare_run</a:t>
+            </a:r>
+            <a:r>
+              <a:rPr lang="en-US" dirty="0" smtClean="0"/>
+              <a:t>, don’t </a:t>
+            </a:r>
+            <a:r>
+              <a:rPr lang="en-US" dirty="0"/>
+              <a:t>do anything </a:t>
+            </a:r>
+            <a:r>
+              <a:rPr lang="en-US" dirty="0" smtClean="0"/>
+              <a:t>if </a:t>
+            </a:r>
+            <a:r>
+              <a:rPr lang="en-US" dirty="0" err="1" smtClean="0"/>
+              <a:t>workspace.pipeline.in_batch_mode</a:t>
+            </a:r>
+            <a:r>
+              <a:rPr lang="en-US" dirty="0" smtClean="0"/>
+              <a:t>()</a:t>
+            </a:r>
+          </a:p>
+          <a:p>
+            <a:pPr lvl="1"/>
+            <a:r>
+              <a:rPr lang="en-US" dirty="0" smtClean="0"/>
+              <a:t>Implement </a:t>
+            </a:r>
+            <a:r>
+              <a:rPr lang="en-US" dirty="0" err="1" smtClean="0"/>
+              <a:t>prepare_to_create_batch</a:t>
+            </a:r>
+            <a:endParaRPr lang="en-US" dirty="0" smtClean="0"/>
+          </a:p>
+          <a:p>
+            <a:pPr lvl="2"/>
+            <a:r>
+              <a:rPr lang="en-US" dirty="0" smtClean="0"/>
+              <a:t>Purpose: </a:t>
+            </a:r>
+          </a:p>
+          <a:p>
+            <a:pPr lvl="3"/>
+            <a:r>
+              <a:rPr lang="en-US" dirty="0" smtClean="0"/>
+              <a:t>windows -&gt; Linux paths</a:t>
+            </a:r>
+          </a:p>
+          <a:p>
+            <a:pPr lvl="3"/>
+            <a:r>
+              <a:rPr lang="en-US" dirty="0" smtClean="0"/>
+              <a:t>Client </a:t>
+            </a:r>
+            <a:r>
+              <a:rPr lang="en-US" dirty="0" err="1" smtClean="0"/>
+              <a:t>filesystem</a:t>
+            </a:r>
+            <a:r>
+              <a:rPr lang="en-US" dirty="0" smtClean="0"/>
+              <a:t> -&gt; cluster </a:t>
+            </a:r>
+            <a:r>
+              <a:rPr lang="en-US" dirty="0" err="1" smtClean="0"/>
+              <a:t>filesystem</a:t>
+            </a:r>
+            <a:endParaRPr lang="en-US" dirty="0" smtClean="0"/>
+          </a:p>
+          <a:p>
+            <a:pPr lvl="2"/>
+            <a:r>
+              <a:rPr lang="en-US" dirty="0" smtClean="0"/>
+              <a:t>Call </a:t>
+            </a:r>
+            <a:r>
+              <a:rPr lang="en-US" dirty="0" err="1" smtClean="0"/>
+              <a:t>measurements.alter_path_for_create_batch</a:t>
+            </a:r>
+            <a:r>
+              <a:rPr lang="en-US" dirty="0" smtClean="0"/>
+              <a:t> with each of your image names</a:t>
+            </a:r>
+          </a:p>
+          <a:p>
+            <a:pPr lvl="2"/>
+            <a:r>
+              <a:rPr lang="en-US" dirty="0" smtClean="0"/>
+              <a:t>Call </a:t>
+            </a:r>
+            <a:r>
+              <a:rPr lang="en-US" dirty="0" err="1" smtClean="0"/>
+              <a:t>DirectoryPath.alter_for_create_batch_files</a:t>
+            </a:r>
+            <a:endParaRPr lang="en-US" dirty="0" smtClean="0"/>
+          </a:p>
+          <a:p>
+            <a:r>
+              <a:rPr lang="en-US" dirty="0" smtClean="0"/>
+              <a:t>Exercise 6c. Make </a:t>
+            </a:r>
+            <a:r>
+              <a:rPr lang="en-US" smtClean="0"/>
+              <a:t>Exercise6b.py batch-friendly</a:t>
+            </a:r>
+            <a:endParaRPr lang="en-US" dirty="0"/>
+          </a:p>
+        </p:txBody>
+      </p:sp>
+    </p:spTree>
+    <p:extLst>
+      <p:ext uri="{BB962C8B-B14F-4D97-AF65-F5344CB8AC3E}">
+        <p14:creationId xmlns:p14="http://schemas.microsoft.com/office/powerpoint/2010/main" val="2646266753"/>
       </p:ext>
     </p:extLst>
   </p:cSld>
@@ -9237,4 +10456,289 @@
     </a:extraClrScheme>
   </a:extraClrSchemeLst>
 </a:theme>
+</file>
+
+<file path=ppt/theme/theme2.xml><?xml version="1.0" encoding="utf-8"?>
+<a:theme xmlns:a="http://schemas.openxmlformats.org/drawingml/2006/main" name="Office Theme">
+  <a:themeElements>
+    <a:clrScheme name="Office">
+      <a:dk1>
+        <a:sysClr val="windowText" lastClr="000000"/>
+      </a:dk1>
+      <a:lt1>
+        <a:sysClr val="window" lastClr="FFFFFF"/>
+      </a:lt1>
+      <a:dk2>
+        <a:srgbClr val="1F497D"/>
+      </a:dk2>
+      <a:lt2>
+        <a:srgbClr val="EEECE1"/>
+      </a:lt2>
+      <a:accent1>
+        <a:srgbClr val="4F81BD"/>
+      </a:accent1>
+      <a:accent2>
+        <a:srgbClr val="C0504D"/>
+      </a:accent2>
+      <a:accent3>
+        <a:srgbClr val="9BBB59"/>
+      </a:accent3>
+      <a:accent4>
+        <a:srgbClr val="8064A2"/>
+      </a:accent4>
+      <a:accent5>
+        <a:srgbClr val="4BACC6"/>
+      </a:accent5>
+      <a:accent6>
+        <a:srgbClr val="F79646"/>
+      </a:accent6>
+      <a:hlink>
+        <a:srgbClr val="0000FF"/>
+      </a:hlink>
+      <a:folHlink>
+        <a:srgbClr val="800080"/>
+      </a:folHlink>
+    </a:clrScheme>
+    <a:fontScheme name="Office">
+      <a:majorFont>
+        <a:latin typeface="Calibri"/>
+        <a:ea typeface=""/>
+        <a:cs typeface=""/>
+        <a:font script="Jpan" typeface="ＭＳ Ｐゴシック"/>
+        <a:font script="Hang" typeface="맑은 고딕"/>
+        <a:font script="Hans" typeface="宋体"/>
+        <a:font script="Hant" typeface="新細明體"/>
+        <a:font script="Arab" typeface="Times New Roman"/>
+        <a:font script="Hebr" typeface="Times New Roman"/>
+        <a:font script="Thai" typeface="Angsana New"/>
+        <a:font script="Ethi" typeface="Nyala"/>
+        <a:font script="Beng" typeface="Vrinda"/>
+        <a:font script="Gujr" typeface="Shruti"/>
+        <a:font script="Khmr" typeface="MoolBoran"/>
+        <a:font script="Knda" typeface="Tunga"/>
+        <a:font script="Guru" typeface="Raavi"/>
+        <a:font script="Cans" typeface="Euphemia"/>
+        <a:font script="Cher" typeface="Plantagenet Cherokee"/>
+        <a:font script="Yiii" typeface="Microsoft Yi Baiti"/>
+        <a:font script="Tibt" typeface="Microsoft Himalaya"/>
+        <a:font script="Thaa" typeface="MV Boli"/>
+        <a:font script="Deva" typeface="Mangal"/>
+        <a:font script="Telu" typeface="Gautami"/>
+        <a:font script="Taml" typeface="Latha"/>
+        <a:font script="Syrc" typeface="Estrangelo Edessa"/>
+        <a:font script="Orya" typeface="Kalinga"/>
+        <a:font script="Mlym" typeface="Kartika"/>
+        <a:font script="Laoo" typeface="DokChampa"/>
+        <a:font script="Sinh" typeface="Iskoola Pota"/>
+        <a:font script="Mong" typeface="Mongolian Baiti"/>
+        <a:font script="Viet" typeface="Times New Roman"/>
+        <a:font script="Uigh" typeface="Microsoft Uighur"/>
+        <a:font script="Geor" typeface="Sylfaen"/>
+      </a:majorFont>
+      <a:minorFont>
+        <a:latin typeface="Calibri"/>
+        <a:ea typeface=""/>
+        <a:cs typeface=""/>
+        <a:font script="Jpan" typeface="ＭＳ Ｐゴシック"/>
+        <a:font script="Hang" typeface="맑은 고딕"/>
+        <a:font script="Hans" typeface="宋体"/>
+        <a:font script="Hant" typeface="新細明體"/>
+        <a:font script="Arab" typeface="Arial"/>
+        <a:font script="Hebr" typeface="Arial"/>
+        <a:font script="Thai" typeface="Cordia New"/>
+        <a:font script="Ethi" typeface="Nyala"/>
+        <a:font script="Beng" typeface="Vrinda"/>
+        <a:font script="Gujr" typeface="Shruti"/>
+        <a:font script="Khmr" typeface="DaunPenh"/>
+        <a:font script="Knda" typeface="Tunga"/>
+        <a:font script="Guru" typeface="Raavi"/>
+        <a:font script="Cans" typeface="Euphemia"/>
+        <a:font script="Cher" typeface="Plantagenet Cherokee"/>
+        <a:font script="Yiii" typeface="Microsoft Yi Baiti"/>
+        <a:font script="Tibt" typeface="Microsoft Himalaya"/>
+        <a:font script="Thaa" typeface="MV Boli"/>
+        <a:font script="Deva" typeface="Mangal"/>
+        <a:font script="Telu" typeface="Gautami"/>
+        <a:font script="Taml" typeface="Latha"/>
+        <a:font script="Syrc" typeface="Estrangelo Edessa"/>
+        <a:font script="Orya" typeface="Kalinga"/>
+        <a:font script="Mlym" typeface="Kartika"/>
+        <a:font script="Laoo" typeface="DokChampa"/>
+        <a:font script="Sinh" typeface="Iskoola Pota"/>
+        <a:font script="Mong" typeface="Mongolian Baiti"/>
+        <a:font script="Viet" typeface="Arial"/>
+        <a:font script="Uigh" typeface="Microsoft Uighur"/>
+        <a:font script="Geor" typeface="Sylfaen"/>
+      </a:minorFont>
+    </a:fontScheme>
+    <a:fmtScheme name="Office">
+      <a:fillStyleLst>
+        <a:solidFill>
+          <a:schemeClr val="phClr"/>
+        </a:solidFill>
+        <a:gradFill rotWithShape="1">
+          <a:gsLst>
+            <a:gs pos="0">
+              <a:schemeClr val="phClr">
+                <a:tint val="50000"/>
+                <a:satMod val="300000"/>
+              </a:schemeClr>
+            </a:gs>
+            <a:gs pos="35000">
+              <a:schemeClr val="phClr">
+                <a:tint val="37000"/>
+                <a:satMod val="300000"/>
+              </a:schemeClr>
+            </a:gs>
+            <a:gs pos="100000">
+              <a:schemeClr val="phClr">
+                <a:tint val="15000"/>
+                <a:satMod val="350000"/>
+              </a:schemeClr>
+            </a:gs>
+          </a:gsLst>
+          <a:lin ang="16200000" scaled="1"/>
+        </a:gradFill>
+        <a:gradFill rotWithShape="1">
+          <a:gsLst>
+            <a:gs pos="0">
+              <a:schemeClr val="phClr">
+                <a:shade val="51000"/>
+                <a:satMod val="130000"/>
+              </a:schemeClr>
+            </a:gs>
+            <a:gs pos="80000">
+              <a:schemeClr val="phClr">
+                <a:shade val="93000"/>
+                <a:satMod val="130000"/>
+              </a:schemeClr>
+            </a:gs>
+            <a:gs pos="100000">
+              <a:schemeClr val="phClr">
+                <a:shade val="94000"/>
+                <a:satMod val="135000"/>
+              </a:schemeClr>
+            </a:gs>
+          </a:gsLst>
+          <a:lin ang="16200000" scaled="0"/>
+        </a:gradFill>
+      </a:fillStyleLst>
+      <a:lnStyleLst>
+        <a:ln w="9525" cap="flat" cmpd="sng" algn="ctr">
+          <a:solidFill>
+            <a:schemeClr val="phClr">
+              <a:shade val="95000"/>
+              <a:satMod val="105000"/>
+            </a:schemeClr>
+          </a:solidFill>
+          <a:prstDash val="solid"/>
+        </a:ln>
+        <a:ln w="25400" cap="flat" cmpd="sng" algn="ctr">
+          <a:solidFill>
+            <a:schemeClr val="phClr"/>
+          </a:solidFill>
+          <a:prstDash val="solid"/>
+        </a:ln>
+        <a:ln w="38100" cap="flat" cmpd="sng" algn="ctr">
+          <a:solidFill>
+            <a:schemeClr val="phClr"/>
+          </a:solidFill>
+          <a:prstDash val="solid"/>
+        </a:ln>
+      </a:lnStyleLst>
+      <a:effectStyleLst>
+        <a:effectStyle>
+          <a:effectLst>
+            <a:outerShdw blurRad="40000" dist="20000" dir="5400000" rotWithShape="0">
+              <a:srgbClr val="000000">
+                <a:alpha val="38000"/>
+              </a:srgbClr>
+            </a:outerShdw>
+          </a:effectLst>
+        </a:effectStyle>
+        <a:effectStyle>
+          <a:effectLst>
+            <a:outerShdw blurRad="40000" dist="23000" dir="5400000" rotWithShape="0">
+              <a:srgbClr val="000000">
+                <a:alpha val="35000"/>
+              </a:srgbClr>
+            </a:outerShdw>
+          </a:effectLst>
+        </a:effectStyle>
+        <a:effectStyle>
+          <a:effectLst>
+            <a:outerShdw blurRad="40000" dist="23000" dir="5400000" rotWithShape="0">
+              <a:srgbClr val="000000">
+                <a:alpha val="35000"/>
+              </a:srgbClr>
+            </a:outerShdw>
+          </a:effectLst>
+          <a:scene3d>
+            <a:camera prst="orthographicFront">
+              <a:rot lat="0" lon="0" rev="0"/>
+            </a:camera>
+            <a:lightRig rig="threePt" dir="t">
+              <a:rot lat="0" lon="0" rev="1200000"/>
+            </a:lightRig>
+          </a:scene3d>
+          <a:sp3d>
+            <a:bevelT w="63500" h="25400"/>
+          </a:sp3d>
+        </a:effectStyle>
+      </a:effectStyleLst>
+      <a:bgFillStyleLst>
+        <a:solidFill>
+          <a:schemeClr val="phClr"/>
+        </a:solidFill>
+        <a:gradFill rotWithShape="1">
+          <a:gsLst>
+            <a:gs pos="0">
+              <a:schemeClr val="phClr">
+                <a:tint val="40000"/>
+                <a:satMod val="350000"/>
+              </a:schemeClr>
+            </a:gs>
+            <a:gs pos="40000">
+              <a:schemeClr val="phClr">
+                <a:tint val="45000"/>
+                <a:shade val="99000"/>
+                <a:satMod val="350000"/>
+              </a:schemeClr>
+            </a:gs>
+            <a:gs pos="100000">
+              <a:schemeClr val="phClr">
+                <a:shade val="20000"/>
+                <a:satMod val="255000"/>
+              </a:schemeClr>
+            </a:gs>
+          </a:gsLst>
+          <a:path path="circle">
+            <a:fillToRect l="50000" t="-80000" r="50000" b="180000"/>
+          </a:path>
+        </a:gradFill>
+        <a:gradFill rotWithShape="1">
+          <a:gsLst>
+            <a:gs pos="0">
+              <a:schemeClr val="phClr">
+                <a:tint val="80000"/>
+                <a:satMod val="300000"/>
+              </a:schemeClr>
+            </a:gs>
+            <a:gs pos="100000">
+              <a:schemeClr val="phClr">
+                <a:shade val="30000"/>
+                <a:satMod val="200000"/>
+              </a:schemeClr>
+            </a:gs>
+          </a:gsLst>
+          <a:path path="circle">
+            <a:fillToRect l="50000" t="50000" r="50000" b="50000"/>
+          </a:path>
+        </a:gradFill>
+      </a:bgFillStyleLst>
+    </a:fmtScheme>
+  </a:themeElements>
+  <a:objectDefaults/>
+  <a:extraClrSchemeLst/>
+</a:theme>
 </file>
</xml_diff>

<commit_message>
Some changes to the tutorial to make track 1 easier
</commit_message>
<xml_diff>
--- a/tutorial/CellProfiler_Developer_Tutorial.pptx
+++ b/tutorial/CellProfiler_Developer_Tutorial.pptx
@@ -231,7 +231,7 @@
           <a:p>
             <a:fld id="{4E4C87E7-C32C-4639-B929-87ED8E592C81}" type="datetimeFigureOut">
               <a:rPr lang="en-US" smtClean="0"/>
-              <a:t>3/26/2013</a:t>
+              <a:t>4/11/2013</a:t>
             </a:fld>
             <a:endParaRPr lang="en-US"/>
           </a:p>
@@ -4255,6 +4255,45 @@
               <a:rPr lang="en-US" dirty="0" smtClean="0"/>
               <a:t>)</a:t>
             </a:r>
+            <a:br>
+              <a:rPr lang="en-US" dirty="0" smtClean="0"/>
+            </a:br>
+            <a:r>
+              <a:rPr lang="en-US" dirty="0" smtClean="0">
+                <a:latin typeface="Courier New" pitchFamily="49" charset="0"/>
+                <a:cs typeface="Courier New" pitchFamily="49" charset="0"/>
+              </a:rPr>
+              <a:t>value = </a:t>
+            </a:r>
+            <a:r>
+              <a:rPr lang="en-US" dirty="0" err="1" smtClean="0">
+                <a:latin typeface="Courier New" pitchFamily="49" charset="0"/>
+                <a:cs typeface="Courier New" pitchFamily="49" charset="0"/>
+              </a:rPr>
+              <a:t>np.var</a:t>
+            </a:r>
+            <a:r>
+              <a:rPr lang="en-US" dirty="0" smtClean="0">
+                <a:latin typeface="Courier New" pitchFamily="49" charset="0"/>
+                <a:cs typeface="Courier New" pitchFamily="49" charset="0"/>
+              </a:rPr>
+              <a:t>(</a:t>
+            </a:r>
+            <a:r>
+              <a:rPr lang="en-US" dirty="0" err="1" smtClean="0">
+                <a:latin typeface="Courier New" pitchFamily="49" charset="0"/>
+                <a:cs typeface="Courier New" pitchFamily="49" charset="0"/>
+              </a:rPr>
+              <a:t>pixel_data</a:t>
+            </a:r>
+            <a:r>
+              <a:rPr lang="en-US" dirty="0" smtClean="0">
+                <a:latin typeface="Courier New" pitchFamily="49" charset="0"/>
+                <a:cs typeface="Courier New" pitchFamily="49" charset="0"/>
+              </a:rPr>
+              <a:t>)</a:t>
+            </a:r>
+            <a:endParaRPr lang="en-US" dirty="0" smtClean="0"/>
           </a:p>
           <a:p>
             <a:pPr lvl="1"/>
@@ -4268,8 +4307,44 @@
             </a:r>
             <a:r>
               <a:rPr lang="en-US" dirty="0" smtClean="0"/>
-              <a:t>() method to get the name of your measurement’s feature</a:t>
-            </a:r>
+              <a:t>() method to get the name of your measurement’s </a:t>
+            </a:r>
+            <a:r>
+              <a:rPr lang="en-US" dirty="0" smtClean="0"/>
+              <a:t>feature</a:t>
+            </a:r>
+            <a:br>
+              <a:rPr lang="en-US" dirty="0" smtClean="0"/>
+            </a:br>
+            <a:r>
+              <a:rPr lang="en-US" dirty="0" err="1" smtClean="0">
+                <a:latin typeface="Courier New" pitchFamily="49" charset="0"/>
+                <a:cs typeface="Courier New" pitchFamily="49" charset="0"/>
+              </a:rPr>
+              <a:t>ftr</a:t>
+            </a:r>
+            <a:r>
+              <a:rPr lang="en-US" dirty="0" smtClean="0">
+                <a:latin typeface="Courier New" pitchFamily="49" charset="0"/>
+                <a:cs typeface="Courier New" pitchFamily="49" charset="0"/>
+              </a:rPr>
+              <a:t> = </a:t>
+            </a:r>
+            <a:r>
+              <a:rPr lang="en-US" dirty="0" err="1" smtClean="0">
+                <a:latin typeface="Courier New" pitchFamily="49" charset="0"/>
+                <a:cs typeface="Courier New" pitchFamily="49" charset="0"/>
+              </a:rPr>
+              <a:t>self.get_feature_name</a:t>
+            </a:r>
+            <a:r>
+              <a:rPr lang="en-US" dirty="0" smtClean="0">
+                <a:latin typeface="Courier New" pitchFamily="49" charset="0"/>
+                <a:cs typeface="Courier New" pitchFamily="49" charset="0"/>
+              </a:rPr>
+              <a:t>()</a:t>
+            </a:r>
+            <a:endParaRPr lang="en-US" dirty="0" smtClean="0"/>
           </a:p>
           <a:p>
             <a:pPr lvl="1"/>
@@ -4314,8 +4389,81 @@
             </a:r>
             <a:r>
               <a:rPr lang="en-US" dirty="0" smtClean="0"/>
-              <a:t> for your module</a:t>
-            </a:r>
+              <a:t> for your </a:t>
+            </a:r>
+            <a:r>
+              <a:rPr lang="en-US" dirty="0"/>
+              <a:t>module</a:t>
+            </a:r>
+            <a:br>
+              <a:rPr lang="en-US" dirty="0"/>
+            </a:br>
+            <a:r>
+              <a:rPr lang="en-US" sz="1600" dirty="0">
+                <a:latin typeface="Courier New" pitchFamily="49" charset="0"/>
+                <a:cs typeface="Courier New" pitchFamily="49" charset="0"/>
+              </a:rPr>
+              <a:t> return [(</a:t>
+            </a:r>
+            <a:r>
+              <a:rPr lang="en-US" sz="1600" dirty="0" err="1">
+                <a:latin typeface="Courier New" pitchFamily="49" charset="0"/>
+                <a:cs typeface="Courier New" pitchFamily="49" charset="0"/>
+              </a:rPr>
+              <a:t>cpmeas.IMAGE</a:t>
+            </a:r>
+            <a:r>
+              <a:rPr lang="en-US" sz="1600" dirty="0">
+                <a:latin typeface="Courier New" pitchFamily="49" charset="0"/>
+                <a:cs typeface="Courier New" pitchFamily="49" charset="0"/>
+              </a:rPr>
+              <a:t>, </a:t>
+            </a:r>
+            <a:r>
+              <a:rPr lang="en-US" sz="1600" dirty="0" err="1">
+                <a:latin typeface="Courier New" pitchFamily="49" charset="0"/>
+                <a:cs typeface="Courier New" pitchFamily="49" charset="0"/>
+              </a:rPr>
+              <a:t>self.get_feature_name</a:t>
+            </a:r>
+            <a:r>
+              <a:rPr lang="en-US" sz="1600" dirty="0" smtClean="0">
+                <a:latin typeface="Courier New" pitchFamily="49" charset="0"/>
+                <a:cs typeface="Courier New" pitchFamily="49" charset="0"/>
+              </a:rPr>
+              <a:t>(),</a:t>
+            </a:r>
+            <a:br>
+              <a:rPr lang="en-US" sz="1600" dirty="0" smtClean="0">
+                <a:latin typeface="Courier New" pitchFamily="49" charset="0"/>
+                <a:cs typeface="Courier New" pitchFamily="49" charset="0"/>
+              </a:rPr>
+            </a:br>
+            <a:r>
+              <a:rPr lang="en-US" sz="1600" dirty="0" smtClean="0">
+                <a:latin typeface="Courier New" pitchFamily="49" charset="0"/>
+                <a:cs typeface="Courier New" pitchFamily="49" charset="0"/>
+              </a:rPr>
+              <a:t>          </a:t>
+            </a:r>
+            <a:r>
+              <a:rPr lang="en-US" sz="1600" dirty="0" err="1">
+                <a:latin typeface="Courier New" pitchFamily="49" charset="0"/>
+                <a:cs typeface="Courier New" pitchFamily="49" charset="0"/>
+              </a:rPr>
+              <a:t>cpmeas.COLTYPE_FLOAT</a:t>
+            </a:r>
+            <a:r>
+              <a:rPr lang="en-US" sz="1600" dirty="0">
+                <a:latin typeface="Courier New" pitchFamily="49" charset="0"/>
+                <a:cs typeface="Courier New" pitchFamily="49" charset="0"/>
+              </a:rPr>
+              <a:t>)]</a:t>
+            </a:r>
+            <a:endParaRPr lang="en-US" sz="1600" dirty="0" smtClean="0">
+              <a:latin typeface="Courier New" pitchFamily="49" charset="0"/>
+              <a:cs typeface="Courier New" pitchFamily="49" charset="0"/>
+            </a:endParaRPr>
           </a:p>
         </p:txBody>
       </p:sp>
@@ -4823,128 +4971,301 @@
           <a:p>
             <a:r>
               <a:rPr lang="en-US" dirty="0" smtClean="0"/>
-              <a:t>In the run method</a:t>
-            </a:r>
-          </a:p>
-          <a:p>
-            <a:pPr lvl="1"/>
-            <a:r>
-              <a:rPr lang="en-US" dirty="0" smtClean="0"/>
-              <a:t>Call </a:t>
-            </a:r>
-            <a:r>
-              <a:rPr lang="en-US" dirty="0" err="1" smtClean="0"/>
+              <a:t>In the run </a:t>
+            </a:r>
+            <a:r>
+              <a:rPr lang="en-US" dirty="0" smtClean="0"/>
+              <a:t>method</a:t>
+            </a:r>
+            <a:br>
+              <a:rPr lang="en-US" dirty="0" smtClean="0"/>
+            </a:br>
+            <a:r>
+              <a:rPr lang="en-US" sz="1600" dirty="0" smtClean="0">
+                <a:latin typeface="Courier New" pitchFamily="49" charset="0"/>
+                <a:cs typeface="Courier New" pitchFamily="49" charset="0"/>
+              </a:rPr>
+              <a:t># get the objects</a:t>
+            </a:r>
+            <a:br>
+              <a:rPr lang="en-US" sz="1600" dirty="0" smtClean="0">
+                <a:latin typeface="Courier New" pitchFamily="49" charset="0"/>
+                <a:cs typeface="Courier New" pitchFamily="49" charset="0"/>
+              </a:rPr>
+            </a:br>
+            <a:r>
+              <a:rPr lang="en-US" sz="1600" dirty="0" err="1" smtClean="0">
+                <a:latin typeface="Courier New" pitchFamily="49" charset="0"/>
+                <a:cs typeface="Courier New" pitchFamily="49" charset="0"/>
+              </a:rPr>
+              <a:t>objects</a:t>
+            </a:r>
+            <a:r>
+              <a:rPr lang="en-US" sz="1600" dirty="0" smtClean="0">
+                <a:latin typeface="Courier New" pitchFamily="49" charset="0"/>
+                <a:cs typeface="Courier New" pitchFamily="49" charset="0"/>
+              </a:rPr>
+              <a:t> = </a:t>
+            </a:r>
+            <a:r>
+              <a:rPr lang="en-US" sz="1600" dirty="0" err="1" smtClean="0">
+                <a:latin typeface="Courier New" pitchFamily="49" charset="0"/>
+                <a:cs typeface="Courier New" pitchFamily="49" charset="0"/>
+              </a:rPr>
               <a:t>object_set.get_objects</a:t>
             </a:r>
             <a:r>
-              <a:rPr lang="en-US" dirty="0" smtClean="0"/>
+              <a:rPr lang="en-US" sz="1600" dirty="0" smtClean="0">
+                <a:latin typeface="Courier New" pitchFamily="49" charset="0"/>
+                <a:cs typeface="Courier New" pitchFamily="49" charset="0"/>
+              </a:rPr>
               <a:t>(</a:t>
             </a:r>
             <a:r>
-              <a:rPr lang="en-US" dirty="0" err="1" smtClean="0"/>
+              <a:rPr lang="en-US" sz="1600" dirty="0" err="1" smtClean="0">
+                <a:latin typeface="Courier New" pitchFamily="49" charset="0"/>
+                <a:cs typeface="Courier New" pitchFamily="49" charset="0"/>
+              </a:rPr>
               <a:t>self.input_objects_name.value</a:t>
             </a:r>
             <a:r>
-              <a:rPr lang="en-US" dirty="0" smtClean="0"/>
-              <a:t>) to get the input objects.</a:t>
-            </a:r>
-          </a:p>
-          <a:p>
-            <a:pPr lvl="1"/>
-            <a:r>
-              <a:rPr lang="en-US" dirty="0" smtClean="0"/>
-              <a:t>Call </a:t>
-            </a:r>
-            <a:r>
-              <a:rPr lang="en-US" dirty="0" err="1" smtClean="0"/>
+              <a:rPr lang="en-US" sz="1600" dirty="0" smtClean="0">
+                <a:latin typeface="Courier New" pitchFamily="49" charset="0"/>
+                <a:cs typeface="Courier New" pitchFamily="49" charset="0"/>
+              </a:rPr>
+              <a:t>)</a:t>
+            </a:r>
+            <a:br>
+              <a:rPr lang="en-US" sz="1600" dirty="0" smtClean="0">
+                <a:latin typeface="Courier New" pitchFamily="49" charset="0"/>
+                <a:cs typeface="Courier New" pitchFamily="49" charset="0"/>
+              </a:rPr>
+            </a:br>
+            <a:r>
+              <a:rPr lang="en-US" sz="1600" dirty="0" smtClean="0">
+                <a:latin typeface="Courier New" pitchFamily="49" charset="0"/>
+                <a:cs typeface="Courier New" pitchFamily="49" charset="0"/>
+              </a:rPr>
+              <a:t># create new labels using </a:t>
+            </a:r>
+            <a:r>
+              <a:rPr lang="en-US" sz="1600" dirty="0" err="1" smtClean="0">
+                <a:latin typeface="Courier New" pitchFamily="49" charset="0"/>
+                <a:cs typeface="Courier New" pitchFamily="49" charset="0"/>
+              </a:rPr>
               <a:t>skeletonize_labels</a:t>
             </a:r>
             <a:r>
-              <a:rPr lang="en-US" dirty="0" smtClean="0"/>
+              <a:rPr lang="en-US" sz="1600" dirty="0" smtClean="0">
+                <a:latin typeface="Courier New" pitchFamily="49" charset="0"/>
+                <a:cs typeface="Courier New" pitchFamily="49" charset="0"/>
+              </a:rPr>
+              <a:t/>
+            </a:r>
+            <a:br>
+              <a:rPr lang="en-US" sz="1600" dirty="0" smtClean="0">
+                <a:latin typeface="Courier New" pitchFamily="49" charset="0"/>
+                <a:cs typeface="Courier New" pitchFamily="49" charset="0"/>
+              </a:rPr>
+            </a:br>
+            <a:r>
+              <a:rPr lang="en-US" sz="1600" dirty="0" smtClean="0">
+                <a:latin typeface="Courier New" pitchFamily="49" charset="0"/>
+                <a:cs typeface="Courier New" pitchFamily="49" charset="0"/>
+              </a:rPr>
+              <a:t>labels = </a:t>
+            </a:r>
+            <a:r>
+              <a:rPr lang="en-US" sz="1600" dirty="0" err="1" smtClean="0">
+                <a:latin typeface="Courier New" pitchFamily="49" charset="0"/>
+                <a:cs typeface="Courier New" pitchFamily="49" charset="0"/>
+              </a:rPr>
+              <a:t>skeletonize_labels</a:t>
+            </a:r>
+            <a:r>
+              <a:rPr lang="en-US" sz="1600" dirty="0" smtClean="0">
+                <a:latin typeface="Courier New" pitchFamily="49" charset="0"/>
+                <a:cs typeface="Courier New" pitchFamily="49" charset="0"/>
+              </a:rPr>
               <a:t>(</a:t>
             </a:r>
             <a:r>
-              <a:rPr lang="en-US" dirty="0" err="1" smtClean="0"/>
+              <a:rPr lang="en-US" sz="1600" dirty="0" err="1" smtClean="0">
+                <a:latin typeface="Courier New" pitchFamily="49" charset="0"/>
+                <a:cs typeface="Courier New" pitchFamily="49" charset="0"/>
+              </a:rPr>
               <a:t>objects.segmented</a:t>
             </a:r>
             <a:r>
-              <a:rPr lang="en-US" dirty="0" smtClean="0"/>
-              <a:t>) to get the labeled skeletons of the input objects</a:t>
-            </a:r>
-          </a:p>
-          <a:p>
-            <a:pPr lvl="1"/>
-            <a:r>
-              <a:rPr lang="en-US" dirty="0" smtClean="0"/>
-              <a:t>Make a new Objects instance: </a:t>
-            </a:r>
-            <a:r>
-              <a:rPr lang="en-US" dirty="0" err="1" smtClean="0"/>
+              <a:rPr lang="en-US" sz="1600" dirty="0" smtClean="0">
+                <a:latin typeface="Courier New" pitchFamily="49" charset="0"/>
+                <a:cs typeface="Courier New" pitchFamily="49" charset="0"/>
+              </a:rPr>
+              <a:t>)</a:t>
+            </a:r>
+            <a:br>
+              <a:rPr lang="en-US" sz="1600" dirty="0" smtClean="0">
+                <a:latin typeface="Courier New" pitchFamily="49" charset="0"/>
+                <a:cs typeface="Courier New" pitchFamily="49" charset="0"/>
+              </a:rPr>
+            </a:br>
+            <a:r>
+              <a:rPr lang="en-US" sz="1600" dirty="0" smtClean="0">
+                <a:latin typeface="Courier New" pitchFamily="49" charset="0"/>
+                <a:cs typeface="Courier New" pitchFamily="49" charset="0"/>
+              </a:rPr>
+              <a:t># make a new Objects() instance</a:t>
+            </a:r>
+            <a:br>
+              <a:rPr lang="en-US" sz="1600" dirty="0" smtClean="0">
+                <a:latin typeface="Courier New" pitchFamily="49" charset="0"/>
+                <a:cs typeface="Courier New" pitchFamily="49" charset="0"/>
+              </a:rPr>
+            </a:br>
+            <a:r>
+              <a:rPr lang="en-US" sz="1600" dirty="0" err="1" smtClean="0">
+                <a:latin typeface="Courier New" pitchFamily="49" charset="0"/>
+                <a:cs typeface="Courier New" pitchFamily="49" charset="0"/>
+              </a:rPr>
               <a:t>output_objects</a:t>
             </a:r>
             <a:r>
-              <a:rPr lang="en-US" dirty="0" smtClean="0"/>
-              <a:t>=</a:t>
-            </a:r>
-            <a:r>
-              <a:rPr lang="en-US" dirty="0" err="1" smtClean="0"/>
+              <a:rPr lang="en-US" sz="1600" dirty="0" smtClean="0">
+                <a:latin typeface="Courier New" pitchFamily="49" charset="0"/>
+                <a:cs typeface="Courier New" pitchFamily="49" charset="0"/>
+              </a:rPr>
+              <a:t> = </a:t>
+            </a:r>
+            <a:r>
+              <a:rPr lang="en-US" sz="1600" dirty="0" err="1" smtClean="0">
+                <a:latin typeface="Courier New" pitchFamily="49" charset="0"/>
+                <a:cs typeface="Courier New" pitchFamily="49" charset="0"/>
+              </a:rPr>
               <a:t>cpo.Objects</a:t>
             </a:r>
             <a:r>
-              <a:rPr lang="en-US" dirty="0" smtClean="0"/>
+              <a:rPr lang="en-US" sz="1600" dirty="0" smtClean="0">
+                <a:latin typeface="Courier New" pitchFamily="49" charset="0"/>
+                <a:cs typeface="Courier New" pitchFamily="49" charset="0"/>
+              </a:rPr>
               <a:t>()</a:t>
             </a:r>
-          </a:p>
-          <a:p>
-            <a:pPr lvl="1"/>
-            <a:r>
-              <a:rPr lang="en-US" dirty="0" smtClean="0"/>
-              <a:t>Set the labels matrix: </a:t>
-            </a:r>
-            <a:r>
-              <a:rPr lang="en-US" dirty="0" err="1" smtClean="0"/>
+            <a:br>
+              <a:rPr lang="en-US" sz="1600" dirty="0" smtClean="0">
+                <a:latin typeface="Courier New" pitchFamily="49" charset="0"/>
+                <a:cs typeface="Courier New" pitchFamily="49" charset="0"/>
+              </a:rPr>
+            </a:br>
+            <a:r>
+              <a:rPr lang="en-US" sz="1600" dirty="0" smtClean="0">
+                <a:latin typeface="Courier New" pitchFamily="49" charset="0"/>
+                <a:cs typeface="Courier New" pitchFamily="49" charset="0"/>
+              </a:rPr>
+              <a:t># set the labels matrix</a:t>
+            </a:r>
+            <a:br>
+              <a:rPr lang="en-US" sz="1600" dirty="0" smtClean="0">
+                <a:latin typeface="Courier New" pitchFamily="49" charset="0"/>
+                <a:cs typeface="Courier New" pitchFamily="49" charset="0"/>
+              </a:rPr>
+            </a:br>
+            <a:r>
+              <a:rPr lang="en-US" sz="1600" dirty="0" err="1" smtClean="0">
+                <a:latin typeface="Courier New" pitchFamily="49" charset="0"/>
+                <a:cs typeface="Courier New" pitchFamily="49" charset="0"/>
+              </a:rPr>
               <a:t>output_objects.segmented</a:t>
             </a:r>
             <a:r>
-              <a:rPr lang="en-US" dirty="0" smtClean="0"/>
+              <a:rPr lang="en-US" sz="1600" dirty="0" smtClean="0">
+                <a:latin typeface="Courier New" pitchFamily="49" charset="0"/>
+                <a:cs typeface="Courier New" pitchFamily="49" charset="0"/>
+              </a:rPr>
               <a:t> = labels</a:t>
             </a:r>
-          </a:p>
-          <a:p>
-            <a:pPr lvl="1"/>
-            <a:r>
-              <a:rPr lang="en-US" dirty="0" smtClean="0"/>
-              <a:t>Call </a:t>
-            </a:r>
-            <a:r>
-              <a:rPr lang="en-US" dirty="0" err="1" smtClean="0"/>
+            <a:br>
+              <a:rPr lang="en-US" sz="1600" dirty="0" smtClean="0">
+                <a:latin typeface="Courier New" pitchFamily="49" charset="0"/>
+                <a:cs typeface="Courier New" pitchFamily="49" charset="0"/>
+              </a:rPr>
+            </a:br>
+            <a:r>
+              <a:rPr lang="en-US" sz="1600" dirty="0" smtClean="0">
+                <a:latin typeface="Courier New" pitchFamily="49" charset="0"/>
+                <a:cs typeface="Courier New" pitchFamily="49" charset="0"/>
+              </a:rPr>
+              <a:t># add the objects to the objects set</a:t>
+            </a:r>
+            <a:br>
+              <a:rPr lang="en-US" sz="1600" dirty="0" smtClean="0">
+                <a:latin typeface="Courier New" pitchFamily="49" charset="0"/>
+                <a:cs typeface="Courier New" pitchFamily="49" charset="0"/>
+              </a:rPr>
+            </a:br>
+            <a:r>
+              <a:rPr lang="en-US" sz="1600" dirty="0" err="1" smtClean="0">
+                <a:latin typeface="Courier New" pitchFamily="49" charset="0"/>
+                <a:cs typeface="Courier New" pitchFamily="49" charset="0"/>
+              </a:rPr>
               <a:t>object_set.add_objects</a:t>
             </a:r>
             <a:r>
-              <a:rPr lang="en-US" dirty="0" smtClean="0"/>
+              <a:rPr lang="en-US" sz="1600" dirty="0" smtClean="0">
+                <a:latin typeface="Courier New" pitchFamily="49" charset="0"/>
+                <a:cs typeface="Courier New" pitchFamily="49" charset="0"/>
+              </a:rPr>
               <a:t>(</a:t>
             </a:r>
             <a:r>
-              <a:rPr lang="en-US" dirty="0" err="1" smtClean="0"/>
+              <a:rPr lang="en-US" sz="1600" dirty="0" err="1" smtClean="0">
+                <a:latin typeface="Courier New" pitchFamily="49" charset="0"/>
+                <a:cs typeface="Courier New" pitchFamily="49" charset="0"/>
+              </a:rPr>
               <a:t>output_objects</a:t>
             </a:r>
             <a:r>
-              <a:rPr lang="en-US" dirty="0" smtClean="0"/>
+              <a:rPr lang="en-US" sz="1600" dirty="0" smtClean="0">
+                <a:latin typeface="Courier New" pitchFamily="49" charset="0"/>
+                <a:cs typeface="Courier New" pitchFamily="49" charset="0"/>
+              </a:rPr>
               <a:t>, </a:t>
             </a:r>
-            <a:r>
-              <a:rPr lang="en-US" dirty="0" err="1" smtClean="0"/>
+            <a:br>
+              <a:rPr lang="en-US" sz="1600" dirty="0" smtClean="0">
+                <a:latin typeface="Courier New" pitchFamily="49" charset="0"/>
+                <a:cs typeface="Courier New" pitchFamily="49" charset="0"/>
+              </a:rPr>
+            </a:br>
+            <a:r>
+              <a:rPr lang="en-US" sz="1600" dirty="0" smtClean="0">
+                <a:latin typeface="Courier New" pitchFamily="49" charset="0"/>
+                <a:cs typeface="Courier New" pitchFamily="49" charset="0"/>
+              </a:rPr>
+              <a:t>                       </a:t>
+            </a:r>
+            <a:r>
+              <a:rPr lang="en-US" sz="1600" dirty="0" err="1" smtClean="0">
+                <a:latin typeface="Courier New" pitchFamily="49" charset="0"/>
+                <a:cs typeface="Courier New" pitchFamily="49" charset="0"/>
+              </a:rPr>
               <a:t>self.output_objects_name.value</a:t>
             </a:r>
             <a:r>
-              <a:rPr lang="en-US" dirty="0" smtClean="0"/>
+              <a:rPr lang="en-US" sz="1600" dirty="0" smtClean="0">
+                <a:latin typeface="Courier New" pitchFamily="49" charset="0"/>
+                <a:cs typeface="Courier New" pitchFamily="49" charset="0"/>
+              </a:rPr>
               <a:t>)</a:t>
             </a:r>
           </a:p>
           <a:p>
             <a:r>
               <a:rPr lang="en-US" dirty="0" smtClean="0"/>
-              <a:t>Test it</a:t>
+              <a:t>Test </a:t>
+            </a:r>
+            <a:r>
+              <a:rPr lang="en-US" dirty="0" smtClean="0"/>
+              <a:t>it</a:t>
             </a:r>
           </a:p>
           <a:p>

</xml_diff>